<commit_message>
fix according to the review
</commit_message>
<xml_diff>
--- a/Tutorials/whatiswot/8-JSON_Schema_in_Practice_3/8-JSON_Schema_in_Practice_3.pptx
+++ b/Tutorials/whatiswot/8-JSON_Schema_in_Practice_3/8-JSON_Schema_in_Practice_3.pptx
@@ -235,7 +235,7 @@
           <a:p>
             <a:fld id="{C8D30DF2-F19E-4B38-83C3-5749846EC033}" type="datetimeFigureOut">
               <a:rPr lang="en-US" smtClean="0"/>
-              <a:t>8/31/23</a:t>
+              <a:t>9/4/23</a:t>
             </a:fld>
             <a:endParaRPr lang="en-US"/>
           </a:p>
@@ -1166,7 +1166,7 @@
           <a:p>
             <a:r>
               <a:rPr lang="en-US" dirty="0"/>
-              <a:t>This step actually validates the data and writes the result into a valid </a:t>
+              <a:t>This step actually validates the data and writes the result into a </a:t>
             </a:r>
             <a:r>
               <a:rPr lang="en-US" dirty="0" err="1"/>
@@ -1825,7 +1825,47 @@
             </a:pPr>
             <a:r>
               <a:rPr lang="tr-TR" dirty="0"/>
-              <a:t>We will use the same temperature example that we use for AJV but for Python this time. </a:t>
+              <a:t>We will use the same temperature example that we use for AJV but for Python </a:t>
+            </a:r>
+            <a:r>
+              <a:rPr lang="tr-TR" dirty="0" err="1"/>
+              <a:t>this</a:t>
+            </a:r>
+            <a:r>
+              <a:rPr lang="tr-TR" dirty="0"/>
+              <a:t> time </a:t>
+            </a:r>
+            <a:r>
+              <a:rPr lang="tr-TR" dirty="0" err="1"/>
+              <a:t>with</a:t>
+            </a:r>
+            <a:r>
+              <a:rPr lang="tr-TR" dirty="0"/>
+              <a:t> </a:t>
+            </a:r>
+            <a:r>
+              <a:rPr lang="en-GB" b="0" i="0" u="none" strike="noStrike" dirty="0" err="1">
+                <a:solidFill>
+                  <a:srgbClr val="E6EDF3"/>
+                </a:solidFill>
+                <a:effectLst/>
+                <a:latin typeface="-apple-system"/>
+              </a:rPr>
+              <a:t>jsonschema</a:t>
+            </a:r>
+            <a:r>
+              <a:rPr lang="en-GB" b="0" i="0" u="none" strike="noStrike" dirty="0">
+                <a:solidFill>
+                  <a:srgbClr val="E6EDF3"/>
+                </a:solidFill>
+                <a:effectLst/>
+                <a:latin typeface="-apple-system"/>
+              </a:rPr>
+              <a:t> library</a:t>
+            </a:r>
+            <a:r>
+              <a:rPr lang="tr-TR" dirty="0"/>
+              <a:t>. </a:t>
             </a:r>
           </a:p>
           <a:p>
@@ -2115,7 +2155,7 @@
                 <a:effectLst/>
                 <a:latin typeface="Helvetica Neue" panose="02000503000000020004" pitchFamily="2" charset="0"/>
               </a:rPr>
-              <a:t> structure of Python and variables according to Python language. You see that capital False is used instead of false that is used for JavaScript</a:t>
+              <a:t> structure of Python and variables according to Python language. You see that capital “False” is used instead of ”false” that is used for JavaScript</a:t>
             </a:r>
             <a:r>
               <a:rPr lang="en-US" dirty="0">
@@ -2460,7 +2500,75 @@
             </a:pPr>
             <a:r>
               <a:rPr lang="tr-TR" dirty="0"/>
-              <a:t>The code outputs that the data is not valid since the property; «temperatureOf» </a:t>
+              <a:t>The code outputs that the data is not valid since </a:t>
+            </a:r>
+            <a:r>
+              <a:rPr lang="tr-TR" dirty="0" err="1"/>
+              <a:t>the</a:t>
+            </a:r>
+            <a:r>
+              <a:rPr lang="tr-TR" dirty="0"/>
+              <a:t> </a:t>
+            </a:r>
+            <a:r>
+              <a:rPr lang="tr-TR" dirty="0" err="1"/>
+              <a:t>property</a:t>
+            </a:r>
+            <a:r>
+              <a:rPr lang="tr-TR" dirty="0"/>
+              <a:t>, </a:t>
+            </a:r>
+            <a:r>
+              <a:rPr lang="en-US" sz="1200" b="0" dirty="0">
+                <a:solidFill>
+                  <a:schemeClr val="accent2"/>
+                </a:solidFill>
+                <a:effectLst/>
+                <a:latin typeface="Consolas" panose="020B0609020204030204" pitchFamily="49" charset="0"/>
+              </a:rPr>
+              <a:t> </a:t>
+            </a:r>
+            <a:r>
+              <a:rPr lang="en-US" sz="1200" b="0" dirty="0">
+                <a:solidFill>
+                  <a:schemeClr val="accent2">
+                    <a:lumMod val="75000"/>
+                  </a:schemeClr>
+                </a:solidFill>
+                <a:effectLst/>
+                <a:latin typeface="Consolas" panose="020B0609020204030204" pitchFamily="49" charset="0"/>
+              </a:rPr>
+              <a:t>"</a:t>
+            </a:r>
+            <a:r>
+              <a:rPr lang="tr-TR" dirty="0" err="1"/>
+              <a:t>temperatureOf</a:t>
+            </a:r>
+            <a:r>
+              <a:rPr lang="en-US" sz="1200" b="0" dirty="0">
+                <a:solidFill>
+                  <a:schemeClr val="accent2"/>
+                </a:solidFill>
+                <a:effectLst/>
+                <a:latin typeface="Consolas" panose="020B0609020204030204" pitchFamily="49" charset="0"/>
+              </a:rPr>
+              <a:t> </a:t>
+            </a:r>
+            <a:r>
+              <a:rPr lang="en-US" sz="1200" b="0">
+                <a:solidFill>
+                  <a:schemeClr val="accent2">
+                    <a:lumMod val="75000"/>
+                  </a:schemeClr>
+                </a:solidFill>
+                <a:effectLst/>
+                <a:latin typeface="Consolas" panose="020B0609020204030204" pitchFamily="49" charset="0"/>
+              </a:rPr>
+              <a:t>” is</a:t>
+            </a:r>
+            <a:r>
+              <a:rPr lang="tr-TR"/>
+              <a:t> </a:t>
             </a:r>
             <a:r>
               <a:rPr lang="tr-TR" dirty="0" err="1"/>
@@ -2782,7 +2890,7 @@
             </a:r>
             <a:r>
               <a:rPr lang="en-US" dirty="0"/>
-              <a:t>(https://github.com/python-jsonschema/jsonschema) but there are many other libraries in different programming languages and tools to validate JSON  with JSON Schema. </a:t>
+              <a:t>(https://github.com/python-jsonschema/jsonschema) but there are many other libraries in different programming languages and tools to validate JSON with a JSON Schema. </a:t>
             </a:r>
           </a:p>
         </p:txBody>
@@ -3827,7 +3935,7 @@
           <a:p>
             <a:fld id="{9ECE5CA0-46B4-49A7-9DD0-55B98DAE6B40}" type="datetimeFigureOut">
               <a:rPr lang="en-US" smtClean="0"/>
-              <a:t>8/31/23</a:t>
+              <a:t>9/4/23</a:t>
             </a:fld>
             <a:endParaRPr lang="en-US"/>
           </a:p>
@@ -3997,7 +4105,7 @@
           <a:p>
             <a:fld id="{9ECE5CA0-46B4-49A7-9DD0-55B98DAE6B40}" type="datetimeFigureOut">
               <a:rPr lang="en-US" smtClean="0"/>
-              <a:t>8/31/23</a:t>
+              <a:t>9/4/23</a:t>
             </a:fld>
             <a:endParaRPr lang="en-US"/>
           </a:p>
@@ -4177,7 +4285,7 @@
           <a:p>
             <a:fld id="{9ECE5CA0-46B4-49A7-9DD0-55B98DAE6B40}" type="datetimeFigureOut">
               <a:rPr lang="en-US" smtClean="0"/>
-              <a:t>8/31/23</a:t>
+              <a:t>9/4/23</a:t>
             </a:fld>
             <a:endParaRPr lang="en-US"/>
           </a:p>
@@ -4347,7 +4455,7 @@
           <a:p>
             <a:fld id="{9ECE5CA0-46B4-49A7-9DD0-55B98DAE6B40}" type="datetimeFigureOut">
               <a:rPr lang="en-US" smtClean="0"/>
-              <a:t>8/31/23</a:t>
+              <a:t>9/4/23</a:t>
             </a:fld>
             <a:endParaRPr lang="en-US"/>
           </a:p>
@@ -4593,7 +4701,7 @@
           <a:p>
             <a:fld id="{9ECE5CA0-46B4-49A7-9DD0-55B98DAE6B40}" type="datetimeFigureOut">
               <a:rPr lang="en-US" smtClean="0"/>
-              <a:t>8/31/23</a:t>
+              <a:t>9/4/23</a:t>
             </a:fld>
             <a:endParaRPr lang="en-US"/>
           </a:p>
@@ -4825,7 +4933,7 @@
           <a:p>
             <a:fld id="{9ECE5CA0-46B4-49A7-9DD0-55B98DAE6B40}" type="datetimeFigureOut">
               <a:rPr lang="en-US" smtClean="0"/>
-              <a:t>8/31/23</a:t>
+              <a:t>9/4/23</a:t>
             </a:fld>
             <a:endParaRPr lang="en-US"/>
           </a:p>
@@ -5192,7 +5300,7 @@
           <a:p>
             <a:fld id="{9ECE5CA0-46B4-49A7-9DD0-55B98DAE6B40}" type="datetimeFigureOut">
               <a:rPr lang="en-US" smtClean="0"/>
-              <a:t>8/31/23</a:t>
+              <a:t>9/4/23</a:t>
             </a:fld>
             <a:endParaRPr lang="en-US"/>
           </a:p>
@@ -5310,7 +5418,7 @@
           <a:p>
             <a:fld id="{9ECE5CA0-46B4-49A7-9DD0-55B98DAE6B40}" type="datetimeFigureOut">
               <a:rPr lang="en-US" smtClean="0"/>
-              <a:t>8/31/23</a:t>
+              <a:t>9/4/23</a:t>
             </a:fld>
             <a:endParaRPr lang="en-US"/>
           </a:p>
@@ -5405,7 +5513,7 @@
           <a:p>
             <a:fld id="{9ECE5CA0-46B4-49A7-9DD0-55B98DAE6B40}" type="datetimeFigureOut">
               <a:rPr lang="en-US" smtClean="0"/>
-              <a:t>8/31/23</a:t>
+              <a:t>9/4/23</a:t>
             </a:fld>
             <a:endParaRPr lang="en-US"/>
           </a:p>
@@ -5682,7 +5790,7 @@
           <a:p>
             <a:fld id="{9ECE5CA0-46B4-49A7-9DD0-55B98DAE6B40}" type="datetimeFigureOut">
               <a:rPr lang="en-US" smtClean="0"/>
-              <a:t>8/31/23</a:t>
+              <a:t>9/4/23</a:t>
             </a:fld>
             <a:endParaRPr lang="en-US"/>
           </a:p>
@@ -5939,7 +6047,7 @@
           <a:p>
             <a:fld id="{9ECE5CA0-46B4-49A7-9DD0-55B98DAE6B40}" type="datetimeFigureOut">
               <a:rPr lang="en-US" smtClean="0"/>
-              <a:t>8/31/23</a:t>
+              <a:t>9/4/23</a:t>
             </a:fld>
             <a:endParaRPr lang="en-US"/>
           </a:p>
@@ -6157,7 +6265,7 @@
           <a:p>
             <a:fld id="{9ECE5CA0-46B4-49A7-9DD0-55B98DAE6B40}" type="datetimeFigureOut">
               <a:rPr lang="en-US" smtClean="0"/>
-              <a:t>8/31/23</a:t>
+              <a:t>9/4/23</a:t>
             </a:fld>
             <a:endParaRPr lang="en-US"/>
           </a:p>
@@ -9051,12 +9159,85 @@
             <a:r>
               <a:rPr lang="en-US" sz="1050" b="0" i="0" dirty="0">
                 <a:solidFill>
+                  <a:schemeClr val="accent5"/>
+                </a:solidFill>
+                <a:effectLst/>
+                <a:latin typeface="Consolas" panose="020B0609020204030204" pitchFamily="49" charset="0"/>
+              </a:rPr>
+              <a:t>properties</a:t>
+            </a:r>
+            <a:r>
+              <a:rPr lang="en-US" sz="1050" b="0" i="0" dirty="0">
+                <a:solidFill>
+                  <a:schemeClr val="accent1"/>
+                </a:solidFill>
+                <a:effectLst/>
+                <a:latin typeface="Consolas" panose="020B0609020204030204" pitchFamily="49" charset="0"/>
+              </a:rPr>
+              <a:t>:    { </a:t>
+            </a:r>
+          </a:p>
+          <a:p>
+            <a:r>
+              <a:rPr lang="en-US" sz="1050" dirty="0">
+                <a:solidFill>
+                  <a:schemeClr val="accent1"/>
+                </a:solidFill>
+                <a:latin typeface="Consolas" panose="020B0609020204030204" pitchFamily="49" charset="0"/>
+              </a:rPr>
+              <a:t>		</a:t>
+            </a:r>
+            <a:r>
+              <a:rPr lang="en-US" sz="1050" b="0" i="0" dirty="0">
+                <a:solidFill>
+                  <a:schemeClr val="accent2">
+                    <a:lumMod val="75000"/>
+                  </a:schemeClr>
+                </a:solidFill>
+                <a:effectLst/>
+                <a:latin typeface="Consolas" panose="020B0609020204030204" pitchFamily="49" charset="0"/>
+              </a:rPr>
+              <a:t>temperature</a:t>
+            </a:r>
+            <a:r>
+              <a:rPr lang="en-US" sz="1050" b="0" i="0" dirty="0">
+                <a:solidFill>
+                  <a:schemeClr val="accent1"/>
+                </a:solidFill>
+                <a:effectLst/>
+                <a:latin typeface="Consolas" panose="020B0609020204030204" pitchFamily="49" charset="0"/>
+              </a:rPr>
+              <a:t>: {</a:t>
+            </a:r>
+            <a:r>
+              <a:rPr lang="en-US" sz="1050" b="0" i="0" dirty="0">
+                <a:solidFill>
+                  <a:schemeClr val="accent5"/>
+                </a:solidFill>
+                <a:effectLst/>
+                <a:latin typeface="Consolas" panose="020B0609020204030204" pitchFamily="49" charset="0"/>
+              </a:rPr>
+              <a:t>type</a:t>
+            </a:r>
+            <a:r>
+              <a:rPr lang="en-US" sz="1050" b="0" i="0" dirty="0">
+                <a:solidFill>
+                  <a:schemeClr val="accent1"/>
+                </a:solidFill>
+                <a:effectLst/>
+                <a:latin typeface="Consolas" panose="020B0609020204030204" pitchFamily="49" charset="0"/>
+              </a:rPr>
+              <a:t>: </a:t>
+            </a:r>
+            <a:r>
+              <a:rPr lang="en-US" sz="1050" b="0" i="0" dirty="0">
+                <a:solidFill>
                   <a:schemeClr val="accent2"/>
                 </a:solidFill>
                 <a:effectLst/>
                 <a:latin typeface="Consolas" panose="020B0609020204030204" pitchFamily="49" charset="0"/>
               </a:rPr>
-              <a:t>properties</a:t>
+              <a:t>"number"</a:t>
             </a:r>
             <a:r>
               <a:rPr lang="en-US" sz="1050" b="0" i="0" dirty="0">
@@ -9066,7 +9247,7 @@
                 <a:effectLst/>
                 <a:latin typeface="Consolas" panose="020B0609020204030204" pitchFamily="49" charset="0"/>
               </a:rPr>
-              <a:t>:    { </a:t>
+              <a:t>}, </a:t>
             </a:r>
           </a:p>
           <a:p>
@@ -9082,12 +9263,54 @@
             <a:r>
               <a:rPr lang="en-US" sz="1050" b="0" i="0" dirty="0">
                 <a:solidFill>
+                  <a:schemeClr val="accent2">
+                    <a:lumMod val="75000"/>
+                  </a:schemeClr>
+                </a:solidFill>
+                <a:effectLst/>
+                <a:latin typeface="Consolas" panose="020B0609020204030204" pitchFamily="49" charset="0"/>
+              </a:rPr>
+              <a:t>unit</a:t>
+            </a:r>
+            <a:r>
+              <a:rPr lang="en-US" sz="1050" b="0" i="0" dirty="0">
+                <a:solidFill>
+                  <a:schemeClr val="accent1"/>
+                </a:solidFill>
+                <a:effectLst/>
+                <a:latin typeface="Consolas" panose="020B0609020204030204" pitchFamily="49" charset="0"/>
+              </a:rPr>
+              <a:t>: {</a:t>
+            </a:r>
+            <a:r>
+              <a:rPr lang="en-US" sz="1050" b="0" i="0" dirty="0">
+                <a:solidFill>
+                  <a:schemeClr val="accent5"/>
+                </a:solidFill>
+                <a:effectLst/>
+                <a:latin typeface="Consolas" panose="020B0609020204030204" pitchFamily="49" charset="0"/>
+              </a:rPr>
+              <a:t>type</a:t>
+            </a:r>
+            <a:r>
+              <a:rPr lang="en-US" sz="1050" b="0" i="0" dirty="0">
+                <a:solidFill>
+                  <a:schemeClr val="accent1"/>
+                </a:solidFill>
+                <a:effectLst/>
+                <a:latin typeface="Consolas" panose="020B0609020204030204" pitchFamily="49" charset="0"/>
+              </a:rPr>
+              <a:t>:</a:t>
+            </a:r>
+            <a:r>
+              <a:rPr lang="en-US" sz="1050" b="0" i="0" dirty="0">
+                <a:solidFill>
                   <a:schemeClr val="accent2"/>
                 </a:solidFill>
                 <a:effectLst/>
                 <a:latin typeface="Consolas" panose="020B0609020204030204" pitchFamily="49" charset="0"/>
               </a:rPr>
-              <a:t>temperature</a:t>
+              <a:t> "string"</a:t>
             </a:r>
             <a:r>
               <a:rPr lang="en-US" sz="1050" b="0" i="0" dirty="0">
@@ -9097,6 +9320,63 @@
                 <a:effectLst/>
                 <a:latin typeface="Consolas" panose="020B0609020204030204" pitchFamily="49" charset="0"/>
               </a:rPr>
+              <a:t>}, </a:t>
+            </a:r>
+          </a:p>
+          <a:p>
+            <a:r>
+              <a:rPr lang="en-US" sz="1050" dirty="0">
+                <a:solidFill>
+                  <a:schemeClr val="accent1"/>
+                </a:solidFill>
+                <a:latin typeface="Consolas" panose="020B0609020204030204" pitchFamily="49" charset="0"/>
+              </a:rPr>
+              <a:t>		</a:t>
+            </a:r>
+            <a:r>
+              <a:rPr lang="en-US" sz="1050" b="0" i="0" dirty="0">
+                <a:solidFill>
+                  <a:schemeClr val="accent2">
+                    <a:lumMod val="75000"/>
+                  </a:schemeClr>
+                </a:solidFill>
+                <a:effectLst/>
+                <a:latin typeface="Consolas" panose="020B0609020204030204" pitchFamily="49" charset="0"/>
+              </a:rPr>
+              <a:t>temp</a:t>
+            </a:r>
+            <a:r>
+              <a:rPr lang="tr-TR" sz="1050" b="0" i="0" dirty="0">
+                <a:solidFill>
+                  <a:schemeClr val="accent2">
+                    <a:lumMod val="75000"/>
+                  </a:schemeClr>
+                </a:solidFill>
+                <a:effectLst/>
+                <a:latin typeface="Consolas" panose="020B0609020204030204" pitchFamily="49" charset="0"/>
+              </a:rPr>
+              <a:t>e</a:t>
+            </a:r>
+            <a:r>
+              <a:rPr lang="en-US" sz="1050" b="0" i="0" dirty="0" err="1">
+                <a:solidFill>
+                  <a:schemeClr val="accent2">
+                    <a:lumMod val="75000"/>
+                  </a:schemeClr>
+                </a:solidFill>
+                <a:effectLst/>
+                <a:latin typeface="Consolas" panose="020B0609020204030204" pitchFamily="49" charset="0"/>
+              </a:rPr>
+              <a:t>ratureOf</a:t>
+            </a:r>
+            <a:r>
+              <a:rPr lang="en-US" sz="1050" b="0" i="0" dirty="0">
+                <a:solidFill>
+                  <a:schemeClr val="accent1"/>
+                </a:solidFill>
+                <a:effectLst/>
+                <a:latin typeface="Consolas" panose="020B0609020204030204" pitchFamily="49" charset="0"/>
+              </a:rPr>
               <a:t>: {</a:t>
             </a:r>
             <a:r>
@@ -9127,7 +9407,7 @@
                 <a:effectLst/>
                 <a:latin typeface="Consolas" panose="020B0609020204030204" pitchFamily="49" charset="0"/>
               </a:rPr>
-              <a:t>"number"</a:t>
+              <a:t>"string"</a:t>
             </a:r>
             <a:r>
               <a:rPr lang="en-US" sz="1050" b="0" i="0" dirty="0">
@@ -9137,7 +9417,19 @@
                 <a:effectLst/>
                 <a:latin typeface="Consolas" panose="020B0609020204030204" pitchFamily="49" charset="0"/>
               </a:rPr>
-              <a:t>}, </a:t>
+              <a:t>} </a:t>
+            </a:r>
+          </a:p>
+          <a:p>
+            <a:r>
+              <a:rPr lang="en-US" sz="1050" b="0" i="0" dirty="0">
+                <a:solidFill>
+                  <a:schemeClr val="accent1"/>
+                </a:solidFill>
+                <a:effectLst/>
+                <a:latin typeface="Consolas" panose="020B0609020204030204" pitchFamily="49" charset="0"/>
+              </a:rPr>
+              <a:t>	},</a:t>
             </a:r>
           </a:p>
           <a:p>
@@ -9148,17 +9440,37 @@
                 </a:solidFill>
                 <a:latin typeface="Consolas" panose="020B0609020204030204" pitchFamily="49" charset="0"/>
               </a:rPr>
-              <a:t>		</a:t>
+              <a:t>	</a:t>
             </a:r>
             <a:r>
               <a:rPr lang="en-US" sz="1050" b="0" i="0" dirty="0">
                 <a:solidFill>
+                  <a:schemeClr val="accent5"/>
+                </a:solidFill>
+                <a:effectLst/>
+                <a:latin typeface="Consolas" panose="020B0609020204030204" pitchFamily="49" charset="0"/>
+              </a:rPr>
+              <a:t>required</a:t>
+            </a:r>
+            <a:r>
+              <a:rPr lang="en-US" sz="1050" b="0" i="0" dirty="0">
+                <a:solidFill>
+                  <a:schemeClr val="accent1"/>
+                </a:solidFill>
+                <a:effectLst/>
+                <a:latin typeface="Consolas" panose="020B0609020204030204" pitchFamily="49" charset="0"/>
+              </a:rPr>
+              <a:t>:  [</a:t>
+            </a:r>
+            <a:r>
+              <a:rPr lang="en-US" sz="1050" b="0" i="0" dirty="0">
+                <a:solidFill>
                   <a:schemeClr val="accent2"/>
                 </a:solidFill>
                 <a:effectLst/>
                 <a:latin typeface="Consolas" panose="020B0609020204030204" pitchFamily="49" charset="0"/>
               </a:rPr>
-              <a:t>unit</a:t>
+              <a:t>"temperature"</a:t>
             </a:r>
             <a:r>
               <a:rPr lang="en-US" sz="1050" b="0" i="0" dirty="0">
@@ -9168,237 +9480,43 @@
                 <a:effectLst/>
                 <a:latin typeface="Consolas" panose="020B0609020204030204" pitchFamily="49" charset="0"/>
               </a:rPr>
-              <a:t>: {</a:t>
+              <a:t>, </a:t>
             </a:r>
             <a:r>
               <a:rPr lang="en-US" sz="1050" b="0" i="0" dirty="0">
                 <a:solidFill>
+                  <a:schemeClr val="accent2"/>
+                </a:solidFill>
+                <a:effectLst/>
+                <a:latin typeface="Consolas" panose="020B0609020204030204" pitchFamily="49" charset="0"/>
+              </a:rPr>
+              <a:t>"unit"</a:t>
+            </a:r>
+            <a:r>
+              <a:rPr lang="en-US" sz="1050" b="0" i="0" dirty="0">
+                <a:solidFill>
+                  <a:schemeClr val="accent1"/>
+                </a:solidFill>
+                <a:effectLst/>
+                <a:latin typeface="Consolas" panose="020B0609020204030204" pitchFamily="49" charset="0"/>
+              </a:rPr>
+              <a:t>],</a:t>
+            </a:r>
+          </a:p>
+          <a:p>
+            <a:r>
+              <a:rPr lang="en-US" sz="1050" dirty="0">
+                <a:solidFill>
+                  <a:schemeClr val="accent1"/>
+                </a:solidFill>
+                <a:latin typeface="Consolas" panose="020B0609020204030204" pitchFamily="49" charset="0"/>
+              </a:rPr>
+              <a:t>	</a:t>
+            </a:r>
+            <a:r>
+              <a:rPr lang="en-US" sz="1050" b="0" i="0" dirty="0" err="1">
+                <a:solidFill>
                   <a:schemeClr val="accent5"/>
-                </a:solidFill>
-                <a:effectLst/>
-                <a:latin typeface="Consolas" panose="020B0609020204030204" pitchFamily="49" charset="0"/>
-              </a:rPr>
-              <a:t>type</a:t>
-            </a:r>
-            <a:r>
-              <a:rPr lang="en-US" sz="1050" b="0" i="0" dirty="0">
-                <a:solidFill>
-                  <a:schemeClr val="accent1"/>
-                </a:solidFill>
-                <a:effectLst/>
-                <a:latin typeface="Consolas" panose="020B0609020204030204" pitchFamily="49" charset="0"/>
-              </a:rPr>
-              <a:t>:</a:t>
-            </a:r>
-            <a:r>
-              <a:rPr lang="en-US" sz="1050" b="0" i="0" dirty="0">
-                <a:solidFill>
-                  <a:schemeClr val="accent2"/>
-                </a:solidFill>
-                <a:effectLst/>
-                <a:latin typeface="Consolas" panose="020B0609020204030204" pitchFamily="49" charset="0"/>
-              </a:rPr>
-              <a:t> "string"</a:t>
-            </a:r>
-            <a:r>
-              <a:rPr lang="en-US" sz="1050" b="0" i="0" dirty="0">
-                <a:solidFill>
-                  <a:schemeClr val="accent1"/>
-                </a:solidFill>
-                <a:effectLst/>
-                <a:latin typeface="Consolas" panose="020B0609020204030204" pitchFamily="49" charset="0"/>
-              </a:rPr>
-              <a:t>}, </a:t>
-            </a:r>
-          </a:p>
-          <a:p>
-            <a:r>
-              <a:rPr lang="en-US" sz="1050" dirty="0">
-                <a:solidFill>
-                  <a:schemeClr val="accent1"/>
-                </a:solidFill>
-                <a:latin typeface="Consolas" panose="020B0609020204030204" pitchFamily="49" charset="0"/>
-              </a:rPr>
-              <a:t>		</a:t>
-            </a:r>
-            <a:r>
-              <a:rPr lang="en-US" sz="1050" b="0" i="0" dirty="0">
-                <a:solidFill>
-                  <a:schemeClr val="accent2"/>
-                </a:solidFill>
-                <a:effectLst/>
-                <a:latin typeface="Consolas" panose="020B0609020204030204" pitchFamily="49" charset="0"/>
-              </a:rPr>
-              <a:t>temp</a:t>
-            </a:r>
-            <a:r>
-              <a:rPr lang="tr-TR" sz="1050" b="0" i="0" dirty="0">
-                <a:solidFill>
-                  <a:schemeClr val="accent2"/>
-                </a:solidFill>
-                <a:effectLst/>
-                <a:latin typeface="Consolas" panose="020B0609020204030204" pitchFamily="49" charset="0"/>
-              </a:rPr>
-              <a:t>e</a:t>
-            </a:r>
-            <a:r>
-              <a:rPr lang="en-US" sz="1050" b="0" i="0" dirty="0" err="1">
-                <a:solidFill>
-                  <a:schemeClr val="accent2"/>
-                </a:solidFill>
-                <a:effectLst/>
-                <a:latin typeface="Consolas" panose="020B0609020204030204" pitchFamily="49" charset="0"/>
-              </a:rPr>
-              <a:t>ratureOf</a:t>
-            </a:r>
-            <a:r>
-              <a:rPr lang="en-US" sz="1050" b="0" i="0" dirty="0">
-                <a:solidFill>
-                  <a:schemeClr val="accent1"/>
-                </a:solidFill>
-                <a:effectLst/>
-                <a:latin typeface="Consolas" panose="020B0609020204030204" pitchFamily="49" charset="0"/>
-              </a:rPr>
-              <a:t>: {</a:t>
-            </a:r>
-            <a:r>
-              <a:rPr lang="en-US" sz="1050" b="0" i="0" dirty="0">
-                <a:solidFill>
-                  <a:schemeClr val="accent5"/>
-                </a:solidFill>
-                <a:effectLst/>
-                <a:latin typeface="Consolas" panose="020B0609020204030204" pitchFamily="49" charset="0"/>
-              </a:rPr>
-              <a:t>type</a:t>
-            </a:r>
-            <a:r>
-              <a:rPr lang="en-US" sz="1050" b="0" i="0" dirty="0">
-                <a:solidFill>
-                  <a:schemeClr val="accent1"/>
-                </a:solidFill>
-                <a:effectLst/>
-                <a:latin typeface="Consolas" panose="020B0609020204030204" pitchFamily="49" charset="0"/>
-              </a:rPr>
-              <a:t>: </a:t>
-            </a:r>
-            <a:r>
-              <a:rPr lang="en-US" sz="1050" b="0" i="0" dirty="0">
-                <a:solidFill>
-                  <a:schemeClr val="accent2"/>
-                </a:solidFill>
-                <a:effectLst/>
-                <a:latin typeface="Consolas" panose="020B0609020204030204" pitchFamily="49" charset="0"/>
-              </a:rPr>
-              <a:t>"string"</a:t>
-            </a:r>
-            <a:r>
-              <a:rPr lang="en-US" sz="1050" b="0" i="0" dirty="0">
-                <a:solidFill>
-                  <a:schemeClr val="accent1"/>
-                </a:solidFill>
-                <a:effectLst/>
-                <a:latin typeface="Consolas" panose="020B0609020204030204" pitchFamily="49" charset="0"/>
-              </a:rPr>
-              <a:t>} </a:t>
-            </a:r>
-          </a:p>
-          <a:p>
-            <a:r>
-              <a:rPr lang="en-US" sz="1050" b="0" i="0" dirty="0">
-                <a:solidFill>
-                  <a:schemeClr val="accent1"/>
-                </a:solidFill>
-                <a:effectLst/>
-                <a:latin typeface="Consolas" panose="020B0609020204030204" pitchFamily="49" charset="0"/>
-              </a:rPr>
-              <a:t>},</a:t>
-            </a:r>
-          </a:p>
-          <a:p>
-            <a:r>
-              <a:rPr lang="en-US" sz="1050" dirty="0">
-                <a:solidFill>
-                  <a:schemeClr val="accent1"/>
-                </a:solidFill>
-                <a:latin typeface="Consolas" panose="020B0609020204030204" pitchFamily="49" charset="0"/>
-              </a:rPr>
-              <a:t>	</a:t>
-            </a:r>
-            <a:r>
-              <a:rPr lang="en-US" sz="1050" b="0" i="0" dirty="0">
-                <a:solidFill>
-                  <a:schemeClr val="accent2"/>
-                </a:solidFill>
-                <a:effectLst/>
-                <a:latin typeface="Consolas" panose="020B0609020204030204" pitchFamily="49" charset="0"/>
-              </a:rPr>
-              <a:t>required</a:t>
-            </a:r>
-            <a:r>
-              <a:rPr lang="en-US" sz="1050" b="0" i="0" dirty="0">
-                <a:solidFill>
-                  <a:schemeClr val="accent1"/>
-                </a:solidFill>
-                <a:effectLst/>
-                <a:latin typeface="Consolas" panose="020B0609020204030204" pitchFamily="49" charset="0"/>
-              </a:rPr>
-              <a:t>:  [</a:t>
-            </a:r>
-            <a:r>
-              <a:rPr lang="en-US" sz="1050" b="0" i="0" dirty="0">
-                <a:solidFill>
-                  <a:schemeClr val="accent2"/>
-                </a:solidFill>
-                <a:effectLst/>
-                <a:latin typeface="Consolas" panose="020B0609020204030204" pitchFamily="49" charset="0"/>
-              </a:rPr>
-              <a:t>"temperature"</a:t>
-            </a:r>
-            <a:r>
-              <a:rPr lang="en-US" sz="1050" b="0" i="0" dirty="0">
-                <a:solidFill>
-                  <a:schemeClr val="accent1"/>
-                </a:solidFill>
-                <a:effectLst/>
-                <a:latin typeface="Consolas" panose="020B0609020204030204" pitchFamily="49" charset="0"/>
-              </a:rPr>
-              <a:t>, </a:t>
-            </a:r>
-            <a:r>
-              <a:rPr lang="en-US" sz="1050" b="0" i="0" dirty="0">
-                <a:solidFill>
-                  <a:schemeClr val="accent2"/>
-                </a:solidFill>
-                <a:effectLst/>
-                <a:latin typeface="Consolas" panose="020B0609020204030204" pitchFamily="49" charset="0"/>
-              </a:rPr>
-              <a:t>"unit"</a:t>
-            </a:r>
-            <a:r>
-              <a:rPr lang="en-US" sz="1050" b="0" i="0" dirty="0">
-                <a:solidFill>
-                  <a:schemeClr val="accent1"/>
-                </a:solidFill>
-                <a:effectLst/>
-                <a:latin typeface="Consolas" panose="020B0609020204030204" pitchFamily="49" charset="0"/>
-              </a:rPr>
-              <a:t>],</a:t>
-            </a:r>
-          </a:p>
-          <a:p>
-            <a:r>
-              <a:rPr lang="en-US" sz="1050" dirty="0">
-                <a:solidFill>
-                  <a:schemeClr val="accent1"/>
-                </a:solidFill>
-                <a:latin typeface="Consolas" panose="020B0609020204030204" pitchFamily="49" charset="0"/>
-              </a:rPr>
-              <a:t>	</a:t>
-            </a:r>
-            <a:r>
-              <a:rPr lang="en-US" sz="1050" b="0" i="0" dirty="0" err="1">
-                <a:solidFill>
-                  <a:schemeClr val="accent2"/>
                 </a:solidFill>
                 <a:effectLst/>
                 <a:latin typeface="Consolas" panose="020B0609020204030204" pitchFamily="49" charset="0"/>
@@ -9587,12 +9705,87 @@
             <a:r>
               <a:rPr lang="en-US" sz="1050" b="0" i="0" dirty="0">
                 <a:solidFill>
+                  <a:schemeClr val="accent2">
+                    <a:lumMod val="75000"/>
+                  </a:schemeClr>
+                </a:solidFill>
+                <a:effectLst/>
+                <a:latin typeface="Consolas" panose="020B0609020204030204" pitchFamily="49" charset="0"/>
+              </a:rPr>
+              <a:t>temperature</a:t>
+            </a:r>
+            <a:r>
+              <a:rPr lang="en-US" sz="1050" b="0" i="0" dirty="0">
+                <a:solidFill>
+                  <a:schemeClr val="accent1"/>
+                </a:solidFill>
+                <a:effectLst/>
+                <a:latin typeface="Consolas" panose="020B0609020204030204" pitchFamily="49" charset="0"/>
+              </a:rPr>
+              <a:t>: </a:t>
+            </a:r>
+            <a:r>
+              <a:rPr lang="en-US" sz="1050" b="0" i="0" dirty="0">
+                <a:solidFill>
+                  <a:schemeClr val="accent6"/>
+                </a:solidFill>
+                <a:effectLst/>
+                <a:latin typeface="Consolas" panose="020B0609020204030204" pitchFamily="49" charset="0"/>
+              </a:rPr>
+              <a:t>15.7</a:t>
+            </a:r>
+            <a:r>
+              <a:rPr lang="en-US" sz="1050" b="0" i="0" dirty="0">
+                <a:solidFill>
+                  <a:schemeClr val="accent1"/>
+                </a:solidFill>
+                <a:effectLst/>
+                <a:latin typeface="Consolas" panose="020B0609020204030204" pitchFamily="49" charset="0"/>
+              </a:rPr>
+              <a:t>, 	</a:t>
+            </a:r>
+          </a:p>
+          <a:p>
+            <a:r>
+              <a:rPr lang="en-US" sz="1050" dirty="0">
+                <a:solidFill>
+                  <a:schemeClr val="accent1"/>
+                </a:solidFill>
+                <a:latin typeface="Consolas" panose="020B0609020204030204" pitchFamily="49" charset="0"/>
+              </a:rPr>
+              <a:t>	</a:t>
+            </a:r>
+            <a:r>
+              <a:rPr lang="en-US" sz="1050" b="0" i="0" dirty="0">
+                <a:solidFill>
+                  <a:schemeClr val="accent2">
+                    <a:lumMod val="75000"/>
+                  </a:schemeClr>
+                </a:solidFill>
+                <a:effectLst/>
+                <a:latin typeface="Consolas" panose="020B0609020204030204" pitchFamily="49" charset="0"/>
+              </a:rPr>
+              <a:t>unit</a:t>
+            </a:r>
+            <a:r>
+              <a:rPr lang="en-US" sz="1050" b="0" i="0" dirty="0">
+                <a:solidFill>
+                  <a:schemeClr val="accent1"/>
+                </a:solidFill>
+                <a:effectLst/>
+                <a:latin typeface="Consolas" panose="020B0609020204030204" pitchFamily="49" charset="0"/>
+              </a:rPr>
+              <a:t>: </a:t>
+            </a:r>
+            <a:r>
+              <a:rPr lang="en-US" sz="1050" b="0" i="0" dirty="0">
+                <a:solidFill>
                   <a:schemeClr val="accent2"/>
                 </a:solidFill>
                 <a:effectLst/>
                 <a:latin typeface="Consolas" panose="020B0609020204030204" pitchFamily="49" charset="0"/>
               </a:rPr>
-              <a:t>temperature</a:t>
+              <a:t>"Celsius"</a:t>
             </a:r>
             <a:r>
               <a:rPr lang="en-US" sz="1050" b="0" i="0" dirty="0">
@@ -9602,94 +9795,25 @@
                 <a:effectLst/>
                 <a:latin typeface="Consolas" panose="020B0609020204030204" pitchFamily="49" charset="0"/>
               </a:rPr>
-              <a:t>: </a:t>
+              <a:t>, </a:t>
+            </a:r>
+          </a:p>
+          <a:p>
+            <a:r>
+              <a:rPr lang="en-US" sz="1050" dirty="0">
+                <a:solidFill>
+                  <a:schemeClr val="accent1"/>
+                </a:solidFill>
+                <a:latin typeface="Consolas" panose="020B0609020204030204" pitchFamily="49" charset="0"/>
+              </a:rPr>
+              <a:t>	</a:t>
             </a:r>
             <a:r>
               <a:rPr lang="en-US" sz="1050" b="0" i="0" dirty="0">
                 <a:solidFill>
-                  <a:schemeClr val="accent6"/>
-                </a:solidFill>
-                <a:effectLst/>
-                <a:latin typeface="Consolas" panose="020B0609020204030204" pitchFamily="49" charset="0"/>
-              </a:rPr>
-              <a:t>15.7</a:t>
-            </a:r>
-            <a:r>
-              <a:rPr lang="en-US" sz="1050" b="0" i="0" dirty="0">
-                <a:solidFill>
-                  <a:schemeClr val="accent1"/>
-                </a:solidFill>
-                <a:effectLst/>
-                <a:latin typeface="Consolas" panose="020B0609020204030204" pitchFamily="49" charset="0"/>
-              </a:rPr>
-              <a:t>, 	</a:t>
-            </a:r>
-          </a:p>
-          <a:p>
-            <a:r>
-              <a:rPr lang="en-US" sz="1050" dirty="0">
-                <a:solidFill>
-                  <a:schemeClr val="accent1"/>
-                </a:solidFill>
-                <a:latin typeface="Consolas" panose="020B0609020204030204" pitchFamily="49" charset="0"/>
-              </a:rPr>
-              <a:t>	</a:t>
-            </a:r>
-            <a:r>
-              <a:rPr lang="en-US" sz="1050" b="0" i="0" dirty="0">
-                <a:solidFill>
-                  <a:schemeClr val="accent2"/>
-                </a:solidFill>
-                <a:effectLst/>
-                <a:latin typeface="Consolas" panose="020B0609020204030204" pitchFamily="49" charset="0"/>
-              </a:rPr>
-              <a:t>unit</a:t>
-            </a:r>
-            <a:r>
-              <a:rPr lang="en-US" sz="1050" b="0" i="0" dirty="0">
-                <a:solidFill>
-                  <a:schemeClr val="accent1"/>
-                </a:solidFill>
-                <a:effectLst/>
-                <a:latin typeface="Consolas" panose="020B0609020204030204" pitchFamily="49" charset="0"/>
-              </a:rPr>
-              <a:t>: </a:t>
-            </a:r>
-            <a:r>
-              <a:rPr lang="en-US" sz="1050" b="0" i="0" dirty="0">
-                <a:solidFill>
-                  <a:schemeClr val="accent2"/>
-                </a:solidFill>
-                <a:effectLst/>
-                <a:latin typeface="Consolas" panose="020B0609020204030204" pitchFamily="49" charset="0"/>
-              </a:rPr>
-              <a:t>"Celsius"</a:t>
-            </a:r>
-            <a:r>
-              <a:rPr lang="en-US" sz="1050" b="0" i="0" dirty="0">
-                <a:solidFill>
-                  <a:schemeClr val="accent1"/>
-                </a:solidFill>
-                <a:effectLst/>
-                <a:latin typeface="Consolas" panose="020B0609020204030204" pitchFamily="49" charset="0"/>
-              </a:rPr>
-              <a:t>, </a:t>
-            </a:r>
-          </a:p>
-          <a:p>
-            <a:r>
-              <a:rPr lang="en-US" sz="1050" dirty="0">
-                <a:solidFill>
-                  <a:schemeClr val="accent1"/>
-                </a:solidFill>
-                <a:latin typeface="Consolas" panose="020B0609020204030204" pitchFamily="49" charset="0"/>
-              </a:rPr>
-              <a:t>	</a:t>
-            </a:r>
-            <a:r>
-              <a:rPr lang="en-US" sz="1050" b="0" i="0" dirty="0">
-                <a:solidFill>
-                  <a:schemeClr val="accent2"/>
+                  <a:schemeClr val="accent2">
+                    <a:lumMod val="75000"/>
+                  </a:schemeClr>
                 </a:solidFill>
                 <a:effectLst/>
                 <a:latin typeface="Consolas" panose="020B0609020204030204" pitchFamily="49" charset="0"/>
@@ -9699,7 +9823,9 @@
             <a:r>
               <a:rPr lang="tr-TR" sz="1050" b="0" i="0" dirty="0">
                 <a:solidFill>
-                  <a:schemeClr val="accent2"/>
+                  <a:schemeClr val="accent2">
+                    <a:lumMod val="75000"/>
+                  </a:schemeClr>
                 </a:solidFill>
                 <a:effectLst/>
                 <a:latin typeface="Consolas" panose="020B0609020204030204" pitchFamily="49" charset="0"/>
@@ -9709,7 +9835,9 @@
             <a:r>
               <a:rPr lang="en-US" sz="1050" b="0" i="0" dirty="0" err="1">
                 <a:solidFill>
-                  <a:schemeClr val="accent2"/>
+                  <a:schemeClr val="accent2">
+                    <a:lumMod val="75000"/>
+                  </a:schemeClr>
                 </a:solidFill>
                 <a:effectLst/>
                 <a:latin typeface="Consolas" panose="020B0609020204030204" pitchFamily="49" charset="0"/>
@@ -9774,14 +9902,53 @@
               <a:t> </a:t>
             </a:r>
             <a:r>
+              <a:rPr lang="en-US" sz="1050" b="0" i="0" dirty="0" err="1">
+                <a:solidFill>
+                  <a:schemeClr val="tx2"/>
+                </a:solidFill>
+                <a:effectLst/>
+                <a:latin typeface="Consolas" panose="020B0609020204030204" pitchFamily="49" charset="0"/>
+              </a:rPr>
+              <a:t>is</a:t>
+            </a:r>
+            <a:r>
+              <a:rPr lang="en-US" sz="1050" dirty="0" err="1">
+                <a:solidFill>
+                  <a:schemeClr val="tx2"/>
+                </a:solidFill>
+                <a:latin typeface="Consolas" panose="020B0609020204030204" pitchFamily="49" charset="0"/>
+              </a:rPr>
+              <a:t>V</a:t>
+            </a:r>
+            <a:r>
+              <a:rPr lang="en-US" sz="1050" b="0" i="0" dirty="0" err="1">
+                <a:solidFill>
+                  <a:schemeClr val="tx2"/>
+                </a:solidFill>
+                <a:effectLst/>
+                <a:latin typeface="Consolas" panose="020B0609020204030204" pitchFamily="49" charset="0"/>
+              </a:rPr>
+              <a:t>alid</a:t>
+            </a:r>
+            <a:r>
               <a:rPr lang="en-US" sz="1050" b="0" i="0" dirty="0">
                 <a:solidFill>
+                  <a:schemeClr val="accent1"/>
+                </a:solidFill>
+                <a:effectLst/>
+                <a:latin typeface="Consolas" panose="020B0609020204030204" pitchFamily="49" charset="0"/>
+              </a:rPr>
+              <a:t> = validate(</a:t>
+            </a:r>
+            <a:r>
+              <a:rPr lang="en-US" sz="1050" b="0" i="0" dirty="0">
+                <a:solidFill>
                   <a:schemeClr val="tx2"/>
                 </a:solidFill>
                 <a:effectLst/>
                 <a:latin typeface="Consolas" panose="020B0609020204030204" pitchFamily="49" charset="0"/>
               </a:rPr>
-              <a:t>valid</a:t>
+              <a:t>data</a:t>
             </a:r>
             <a:r>
               <a:rPr lang="en-US" sz="1050" b="0" i="0" dirty="0">
@@ -9791,49 +9958,28 @@
                 <a:effectLst/>
                 <a:latin typeface="Consolas" panose="020B0609020204030204" pitchFamily="49" charset="0"/>
               </a:rPr>
-              <a:t> = validate(</a:t>
-            </a:r>
+              <a:t>) </a:t>
+            </a:r>
+          </a:p>
+          <a:p>
             <a:r>
               <a:rPr lang="en-US" sz="1050" b="0" i="0" dirty="0">
                 <a:solidFill>
+                  <a:schemeClr val="accent1"/>
+                </a:solidFill>
+                <a:effectLst/>
+                <a:latin typeface="Consolas" panose="020B0609020204030204" pitchFamily="49" charset="0"/>
+              </a:rPr>
+              <a:t>if (</a:t>
+            </a:r>
+            <a:r>
+              <a:rPr lang="en-US" sz="1050" dirty="0" err="1">
+                <a:solidFill>
                   <a:schemeClr val="tx2"/>
                 </a:solidFill>
-                <a:effectLst/>
-                <a:latin typeface="Consolas" panose="020B0609020204030204" pitchFamily="49" charset="0"/>
-              </a:rPr>
-              <a:t>data</a:t>
-            </a:r>
-            <a:r>
-              <a:rPr lang="en-US" sz="1050" b="0" i="0" dirty="0">
-                <a:solidFill>
-                  <a:schemeClr val="accent1"/>
-                </a:solidFill>
-                <a:effectLst/>
-                <a:latin typeface="Consolas" panose="020B0609020204030204" pitchFamily="49" charset="0"/>
-              </a:rPr>
-              <a:t>) </a:t>
-            </a:r>
-          </a:p>
-          <a:p>
-            <a:r>
-              <a:rPr lang="en-US" sz="1050" b="0" i="0" dirty="0">
-                <a:solidFill>
-                  <a:schemeClr val="accent1"/>
-                </a:solidFill>
-                <a:effectLst/>
-                <a:latin typeface="Consolas" panose="020B0609020204030204" pitchFamily="49" charset="0"/>
-              </a:rPr>
-              <a:t>if (</a:t>
-            </a:r>
-            <a:r>
-              <a:rPr lang="en-US" sz="1050" b="0" i="0" dirty="0">
-                <a:solidFill>
-                  <a:schemeClr val="tx2"/>
-                </a:solidFill>
-                <a:effectLst/>
-                <a:latin typeface="Consolas" panose="020B0609020204030204" pitchFamily="49" charset="0"/>
-              </a:rPr>
-              <a:t>valid</a:t>
+                <a:latin typeface="Consolas" panose="020B0609020204030204" pitchFamily="49" charset="0"/>
+              </a:rPr>
+              <a:t>isValid</a:t>
             </a:r>
             <a:r>
               <a:rPr lang="en-US" sz="1050" b="0" i="0" dirty="0">
@@ -11505,7 +11651,7 @@
               <a:r>
                 <a:rPr lang="en-US" sz="2000" b="0" i="0" dirty="0">
                   <a:solidFill>
-                    <a:schemeClr val="accent2"/>
+                    <a:schemeClr val="accent5"/>
                   </a:solidFill>
                   <a:effectLst/>
                   <a:latin typeface="Consolas" panose="020B0609020204030204" pitchFamily="49" charset="0"/>
@@ -11536,7 +11682,9 @@
               <a:r>
                 <a:rPr lang="en-US" sz="2000" b="0" i="0" dirty="0">
                   <a:solidFill>
-                    <a:schemeClr val="accent2"/>
+                    <a:schemeClr val="accent2">
+                      <a:lumMod val="75000"/>
+                    </a:schemeClr>
                   </a:solidFill>
                   <a:effectLst/>
                   <a:latin typeface="Consolas" panose="020B0609020204030204" pitchFamily="49" charset="0"/>
@@ -11607,7 +11755,9 @@
               <a:r>
                 <a:rPr lang="en-US" sz="2000" b="0" i="0" dirty="0">
                   <a:solidFill>
-                    <a:schemeClr val="accent2"/>
+                    <a:schemeClr val="accent2">
+                      <a:lumMod val="75000"/>
+                    </a:schemeClr>
                   </a:solidFill>
                   <a:effectLst/>
                   <a:latin typeface="Consolas" panose="020B0609020204030204" pitchFamily="49" charset="0"/>
@@ -11678,7 +11828,9 @@
               <a:r>
                 <a:rPr lang="en-US" sz="2000" b="0" i="0" dirty="0">
                   <a:solidFill>
-                    <a:schemeClr val="accent2"/>
+                    <a:schemeClr val="accent2">
+                      <a:lumMod val="75000"/>
+                    </a:schemeClr>
                   </a:solidFill>
                   <a:effectLst/>
                   <a:latin typeface="Consolas" panose="020B0609020204030204" pitchFamily="49" charset="0"/>
@@ -11688,7 +11840,9 @@
               <a:r>
                 <a:rPr lang="tr-TR" sz="2000" b="0" i="0" dirty="0">
                   <a:solidFill>
-                    <a:schemeClr val="accent2"/>
+                    <a:schemeClr val="accent2">
+                      <a:lumMod val="75000"/>
+                    </a:schemeClr>
                   </a:solidFill>
                   <a:effectLst/>
                   <a:latin typeface="Consolas" panose="020B0609020204030204" pitchFamily="49" charset="0"/>
@@ -11698,7 +11852,9 @@
               <a:r>
                 <a:rPr lang="en-US" sz="2000" b="0" i="0" dirty="0" err="1">
                   <a:solidFill>
-                    <a:schemeClr val="accent2"/>
+                    <a:schemeClr val="accent2">
+                      <a:lumMod val="75000"/>
+                    </a:schemeClr>
                   </a:solidFill>
                   <a:effectLst/>
                   <a:latin typeface="Consolas" panose="020B0609020204030204" pitchFamily="49" charset="0"/>
@@ -11765,7 +11921,7 @@
                   <a:effectLst/>
                   <a:latin typeface="Consolas" panose="020B0609020204030204" pitchFamily="49" charset="0"/>
                 </a:rPr>
-                <a:t>},</a:t>
+                <a:t>	},</a:t>
               </a:r>
             </a:p>
             <a:p>
@@ -11781,7 +11937,7 @@
               <a:r>
                 <a:rPr lang="en-US" sz="2000" b="0" i="0" dirty="0">
                   <a:solidFill>
-                    <a:schemeClr val="accent2"/>
+                    <a:schemeClr val="accent5"/>
                   </a:solidFill>
                   <a:effectLst/>
                   <a:latin typeface="Consolas" panose="020B0609020204030204" pitchFamily="49" charset="0"/>
@@ -11852,7 +12008,7 @@
               <a:r>
                 <a:rPr lang="en-US" sz="2000" b="0" i="0" dirty="0" err="1">
                   <a:solidFill>
-                    <a:schemeClr val="accent2"/>
+                    <a:schemeClr val="accent5"/>
                   </a:solidFill>
                   <a:effectLst/>
                   <a:latin typeface="Consolas" panose="020B0609020204030204" pitchFamily="49" charset="0"/>
@@ -12434,7 +12590,9 @@
               <a:r>
                 <a:rPr lang="en-US" sz="2400" b="0" i="0" dirty="0">
                   <a:solidFill>
-                    <a:schemeClr val="accent2"/>
+                    <a:schemeClr val="accent2">
+                      <a:lumMod val="75000"/>
+                    </a:schemeClr>
                   </a:solidFill>
                   <a:effectLst/>
                   <a:latin typeface="Consolas" panose="020B0609020204030204" pitchFamily="49" charset="0"/>
@@ -12485,7 +12643,9 @@
               <a:r>
                 <a:rPr lang="en-US" sz="2400" b="0" i="0" dirty="0">
                   <a:solidFill>
-                    <a:schemeClr val="accent2"/>
+                    <a:schemeClr val="accent2">
+                      <a:lumMod val="75000"/>
+                    </a:schemeClr>
                   </a:solidFill>
                   <a:effectLst/>
                   <a:latin typeface="Consolas" panose="020B0609020204030204" pitchFamily="49" charset="0"/>
@@ -12527,7 +12687,9 @@
               <a:r>
                 <a:rPr lang="en-US" sz="2400" dirty="0">
                   <a:solidFill>
-                    <a:schemeClr val="accent1"/>
+                    <a:schemeClr val="accent2">
+                      <a:lumMod val="75000"/>
+                    </a:schemeClr>
                   </a:solidFill>
                   <a:latin typeface="Consolas" panose="020B0609020204030204" pitchFamily="49" charset="0"/>
                 </a:rPr>
@@ -12536,7 +12698,9 @@
               <a:r>
                 <a:rPr lang="en-US" sz="2400" b="0" i="0" dirty="0">
                   <a:solidFill>
-                    <a:schemeClr val="accent2"/>
+                    <a:schemeClr val="accent2">
+                      <a:lumMod val="75000"/>
+                    </a:schemeClr>
                   </a:solidFill>
                   <a:effectLst/>
                   <a:latin typeface="Consolas" panose="020B0609020204030204" pitchFamily="49" charset="0"/>
@@ -12546,7 +12710,9 @@
               <a:r>
                 <a:rPr lang="tr-TR" sz="2400" b="0" i="0" dirty="0">
                   <a:solidFill>
-                    <a:schemeClr val="accent2"/>
+                    <a:schemeClr val="accent2">
+                      <a:lumMod val="75000"/>
+                    </a:schemeClr>
                   </a:solidFill>
                   <a:effectLst/>
                   <a:latin typeface="Consolas" panose="020B0609020204030204" pitchFamily="49" charset="0"/>
@@ -12556,7 +12722,9 @@
               <a:r>
                 <a:rPr lang="en-US" sz="2400" b="0" i="0" dirty="0" err="1">
                   <a:solidFill>
-                    <a:schemeClr val="accent2"/>
+                    <a:schemeClr val="accent2">
+                      <a:lumMod val="75000"/>
+                    </a:schemeClr>
                   </a:solidFill>
                   <a:effectLst/>
                   <a:latin typeface="Consolas" panose="020B0609020204030204" pitchFamily="49" charset="0"/>
@@ -12655,10 +12823,10 @@
         </p:nvGrpSpPr>
         <p:grpSpPr>
           <a:xfrm>
-            <a:off x="1621972" y="2939144"/>
-            <a:ext cx="8948057" cy="979712"/>
+            <a:off x="1538842" y="2939144"/>
+            <a:ext cx="9170719" cy="979712"/>
             <a:chOff x="1737360" y="2939147"/>
-            <a:chExt cx="8948057" cy="979712"/>
+            <a:chExt cx="9170719" cy="979712"/>
           </a:xfrm>
         </p:grpSpPr>
         <p:sp>
@@ -12722,7 +12890,7 @@
           <p:spPr>
             <a:xfrm>
               <a:off x="5660569" y="3198170"/>
-              <a:ext cx="5024848" cy="461665"/>
+              <a:ext cx="5247510" cy="461665"/>
             </a:xfrm>
             <a:prstGeom prst="rect">
               <a:avLst/>
@@ -12759,14 +12927,23 @@
                 <a:t> </a:t>
               </a:r>
               <a:r>
-                <a:rPr lang="en-US" sz="2400" b="0" i="0" dirty="0">
+                <a:rPr lang="en-US" sz="2400" dirty="0" err="1">
                   <a:solidFill>
                     <a:schemeClr val="tx2"/>
                   </a:solidFill>
+                  <a:latin typeface="Consolas" panose="020B0609020204030204" pitchFamily="49" charset="0"/>
+                </a:rPr>
+                <a:t>isV</a:t>
+              </a:r>
+              <a:r>
+                <a:rPr lang="en-US" sz="2400" b="0" i="0" dirty="0" err="1">
+                  <a:solidFill>
+                    <a:schemeClr val="tx2"/>
+                  </a:solidFill>
                   <a:effectLst/>
                   <a:latin typeface="Consolas" panose="020B0609020204030204" pitchFamily="49" charset="0"/>
                 </a:rPr>
-                <a:t>valid</a:t>
+                <a:t>alid</a:t>
               </a:r>
               <a:r>
                 <a:rPr lang="en-US" sz="2400" b="0" i="0" dirty="0">
@@ -13022,16 +13199,26 @@
                 <a:t>if (</a:t>
               </a:r>
               <a:r>
-                <a:rPr lang="en-US" sz="2000" dirty="0">
+                <a:rPr lang="en-US" sz="2000" b="0" i="0" dirty="0" err="1">
                   <a:solidFill>
                     <a:schemeClr val="tx2"/>
                   </a:solidFill>
+                  <a:effectLst/>
+                  <a:latin typeface="Consolas" panose="020B0609020204030204" pitchFamily="49" charset="0"/>
+                </a:rPr>
+                <a:t>is</a:t>
+              </a:r>
+              <a:r>
+                <a:rPr lang="en-US" sz="2000" dirty="0" err="1">
+                  <a:solidFill>
+                    <a:schemeClr val="tx2"/>
+                  </a:solidFill>
                   <a:latin typeface="Consolas" panose="020B0609020204030204" pitchFamily="49" charset="0"/>
                 </a:rPr>
                 <a:t>V</a:t>
               </a:r>
               <a:r>
-                <a:rPr lang="en-US" sz="2000" b="0" i="0" dirty="0">
+                <a:rPr lang="en-US" sz="2000" b="0" i="0" dirty="0" err="1">
                   <a:solidFill>
                     <a:schemeClr val="tx2"/>
                   </a:solidFill>
@@ -16664,12 +16851,85 @@
             <a:r>
               <a:rPr lang="en-US" sz="1050" b="0" i="0" dirty="0">
                 <a:solidFill>
+                  <a:schemeClr val="accent5"/>
+                </a:solidFill>
+                <a:effectLst/>
+                <a:latin typeface="Consolas" panose="020B0609020204030204" pitchFamily="49" charset="0"/>
+              </a:rPr>
+              <a:t>properties</a:t>
+            </a:r>
+            <a:r>
+              <a:rPr lang="en-US" sz="1050" b="0" i="0" dirty="0">
+                <a:solidFill>
+                  <a:schemeClr val="accent1"/>
+                </a:solidFill>
+                <a:effectLst/>
+                <a:latin typeface="Consolas" panose="020B0609020204030204" pitchFamily="49" charset="0"/>
+              </a:rPr>
+              <a:t>:    { </a:t>
+            </a:r>
+          </a:p>
+          <a:p>
+            <a:r>
+              <a:rPr lang="en-US" sz="1050" dirty="0">
+                <a:solidFill>
+                  <a:schemeClr val="accent1"/>
+                </a:solidFill>
+                <a:latin typeface="Consolas" panose="020B0609020204030204" pitchFamily="49" charset="0"/>
+              </a:rPr>
+              <a:t>		</a:t>
+            </a:r>
+            <a:r>
+              <a:rPr lang="en-US" sz="1050" b="0" i="0" dirty="0">
+                <a:solidFill>
+                  <a:schemeClr val="accent2">
+                    <a:lumMod val="75000"/>
+                  </a:schemeClr>
+                </a:solidFill>
+                <a:effectLst/>
+                <a:latin typeface="Consolas" panose="020B0609020204030204" pitchFamily="49" charset="0"/>
+              </a:rPr>
+              <a:t>temperature</a:t>
+            </a:r>
+            <a:r>
+              <a:rPr lang="en-US" sz="1050" b="0" i="0" dirty="0">
+                <a:solidFill>
+                  <a:schemeClr val="accent1"/>
+                </a:solidFill>
+                <a:effectLst/>
+                <a:latin typeface="Consolas" panose="020B0609020204030204" pitchFamily="49" charset="0"/>
+              </a:rPr>
+              <a:t>: {</a:t>
+            </a:r>
+            <a:r>
+              <a:rPr lang="en-US" sz="1050" b="0" i="0" dirty="0">
+                <a:solidFill>
+                  <a:schemeClr val="accent5"/>
+                </a:solidFill>
+                <a:effectLst/>
+                <a:latin typeface="Consolas" panose="020B0609020204030204" pitchFamily="49" charset="0"/>
+              </a:rPr>
+              <a:t>type</a:t>
+            </a:r>
+            <a:r>
+              <a:rPr lang="en-US" sz="1050" b="0" i="0" dirty="0">
+                <a:solidFill>
+                  <a:schemeClr val="accent1"/>
+                </a:solidFill>
+                <a:effectLst/>
+                <a:latin typeface="Consolas" panose="020B0609020204030204" pitchFamily="49" charset="0"/>
+              </a:rPr>
+              <a:t>: </a:t>
+            </a:r>
+            <a:r>
+              <a:rPr lang="en-US" sz="1050" b="0" i="0" dirty="0">
+                <a:solidFill>
                   <a:schemeClr val="accent2"/>
                 </a:solidFill>
                 <a:effectLst/>
                 <a:latin typeface="Consolas" panose="020B0609020204030204" pitchFamily="49" charset="0"/>
               </a:rPr>
-              <a:t>properties</a:t>
+              <a:t>"number"</a:t>
             </a:r>
             <a:r>
               <a:rPr lang="en-US" sz="1050" b="0" i="0" dirty="0">
@@ -16679,7 +16939,7 @@
                 <a:effectLst/>
                 <a:latin typeface="Consolas" panose="020B0609020204030204" pitchFamily="49" charset="0"/>
               </a:rPr>
-              <a:t>:    { </a:t>
+              <a:t>}, </a:t>
             </a:r>
           </a:p>
           <a:p>
@@ -16695,12 +16955,54 @@
             <a:r>
               <a:rPr lang="en-US" sz="1050" b="0" i="0" dirty="0">
                 <a:solidFill>
+                  <a:schemeClr val="accent2">
+                    <a:lumMod val="75000"/>
+                  </a:schemeClr>
+                </a:solidFill>
+                <a:effectLst/>
+                <a:latin typeface="Consolas" panose="020B0609020204030204" pitchFamily="49" charset="0"/>
+              </a:rPr>
+              <a:t>unit</a:t>
+            </a:r>
+            <a:r>
+              <a:rPr lang="en-US" sz="1050" b="0" i="0" dirty="0">
+                <a:solidFill>
+                  <a:schemeClr val="accent1"/>
+                </a:solidFill>
+                <a:effectLst/>
+                <a:latin typeface="Consolas" panose="020B0609020204030204" pitchFamily="49" charset="0"/>
+              </a:rPr>
+              <a:t>: {</a:t>
+            </a:r>
+            <a:r>
+              <a:rPr lang="en-US" sz="1050" b="0" i="0" dirty="0">
+                <a:solidFill>
+                  <a:schemeClr val="accent5"/>
+                </a:solidFill>
+                <a:effectLst/>
+                <a:latin typeface="Consolas" panose="020B0609020204030204" pitchFamily="49" charset="0"/>
+              </a:rPr>
+              <a:t>type</a:t>
+            </a:r>
+            <a:r>
+              <a:rPr lang="en-US" sz="1050" b="0" i="0" dirty="0">
+                <a:solidFill>
+                  <a:schemeClr val="accent1"/>
+                </a:solidFill>
+                <a:effectLst/>
+                <a:latin typeface="Consolas" panose="020B0609020204030204" pitchFamily="49" charset="0"/>
+              </a:rPr>
+              <a:t>:</a:t>
+            </a:r>
+            <a:r>
+              <a:rPr lang="en-US" sz="1050" b="0" i="0" dirty="0">
+                <a:solidFill>
                   <a:schemeClr val="accent2"/>
                 </a:solidFill>
                 <a:effectLst/>
                 <a:latin typeface="Consolas" panose="020B0609020204030204" pitchFamily="49" charset="0"/>
               </a:rPr>
-              <a:t>temperature</a:t>
+              <a:t> "string"</a:t>
             </a:r>
             <a:r>
               <a:rPr lang="en-US" sz="1050" b="0" i="0" dirty="0">
@@ -16710,6 +17012,63 @@
                 <a:effectLst/>
                 <a:latin typeface="Consolas" panose="020B0609020204030204" pitchFamily="49" charset="0"/>
               </a:rPr>
+              <a:t>}, </a:t>
+            </a:r>
+          </a:p>
+          <a:p>
+            <a:r>
+              <a:rPr lang="en-US" sz="1050" dirty="0">
+                <a:solidFill>
+                  <a:schemeClr val="accent1"/>
+                </a:solidFill>
+                <a:latin typeface="Consolas" panose="020B0609020204030204" pitchFamily="49" charset="0"/>
+              </a:rPr>
+              <a:t>		</a:t>
+            </a:r>
+            <a:r>
+              <a:rPr lang="en-US" sz="1050" b="0" i="0" dirty="0">
+                <a:solidFill>
+                  <a:schemeClr val="accent2">
+                    <a:lumMod val="75000"/>
+                  </a:schemeClr>
+                </a:solidFill>
+                <a:effectLst/>
+                <a:latin typeface="Consolas" panose="020B0609020204030204" pitchFamily="49" charset="0"/>
+              </a:rPr>
+              <a:t>temp</a:t>
+            </a:r>
+            <a:r>
+              <a:rPr lang="tr-TR" sz="1050" b="0" i="0" dirty="0">
+                <a:solidFill>
+                  <a:schemeClr val="accent2">
+                    <a:lumMod val="75000"/>
+                  </a:schemeClr>
+                </a:solidFill>
+                <a:effectLst/>
+                <a:latin typeface="Consolas" panose="020B0609020204030204" pitchFamily="49" charset="0"/>
+              </a:rPr>
+              <a:t>e</a:t>
+            </a:r>
+            <a:r>
+              <a:rPr lang="en-US" sz="1050" b="0" i="0" dirty="0" err="1">
+                <a:solidFill>
+                  <a:schemeClr val="accent2">
+                    <a:lumMod val="75000"/>
+                  </a:schemeClr>
+                </a:solidFill>
+                <a:effectLst/>
+                <a:latin typeface="Consolas" panose="020B0609020204030204" pitchFamily="49" charset="0"/>
+              </a:rPr>
+              <a:t>ratureOf</a:t>
+            </a:r>
+            <a:r>
+              <a:rPr lang="en-US" sz="1050" b="0" i="0" dirty="0">
+                <a:solidFill>
+                  <a:schemeClr val="accent1"/>
+                </a:solidFill>
+                <a:effectLst/>
+                <a:latin typeface="Consolas" panose="020B0609020204030204" pitchFamily="49" charset="0"/>
+              </a:rPr>
               <a:t>: {</a:t>
             </a:r>
             <a:r>
@@ -16740,7 +17099,7 @@
                 <a:effectLst/>
                 <a:latin typeface="Consolas" panose="020B0609020204030204" pitchFamily="49" charset="0"/>
               </a:rPr>
-              <a:t>"number"</a:t>
+              <a:t>"string"</a:t>
             </a:r>
             <a:r>
               <a:rPr lang="en-US" sz="1050" b="0" i="0" dirty="0">
@@ -16750,7 +17109,19 @@
                 <a:effectLst/>
                 <a:latin typeface="Consolas" panose="020B0609020204030204" pitchFamily="49" charset="0"/>
               </a:rPr>
-              <a:t>}, </a:t>
+              <a:t>} </a:t>
+            </a:r>
+          </a:p>
+          <a:p>
+            <a:r>
+              <a:rPr lang="en-US" sz="1050" b="0" i="0" dirty="0">
+                <a:solidFill>
+                  <a:schemeClr val="accent1"/>
+                </a:solidFill>
+                <a:effectLst/>
+                <a:latin typeface="Consolas" panose="020B0609020204030204" pitchFamily="49" charset="0"/>
+              </a:rPr>
+              <a:t>	},</a:t>
             </a:r>
           </a:p>
           <a:p>
@@ -16761,17 +17132,37 @@
                 </a:solidFill>
                 <a:latin typeface="Consolas" panose="020B0609020204030204" pitchFamily="49" charset="0"/>
               </a:rPr>
-              <a:t>		</a:t>
+              <a:t>	</a:t>
             </a:r>
             <a:r>
               <a:rPr lang="en-US" sz="1050" b="0" i="0" dirty="0">
                 <a:solidFill>
+                  <a:schemeClr val="accent5"/>
+                </a:solidFill>
+                <a:effectLst/>
+                <a:latin typeface="Consolas" panose="020B0609020204030204" pitchFamily="49" charset="0"/>
+              </a:rPr>
+              <a:t>required</a:t>
+            </a:r>
+            <a:r>
+              <a:rPr lang="en-US" sz="1050" b="0" i="0" dirty="0">
+                <a:solidFill>
+                  <a:schemeClr val="accent1"/>
+                </a:solidFill>
+                <a:effectLst/>
+                <a:latin typeface="Consolas" panose="020B0609020204030204" pitchFamily="49" charset="0"/>
+              </a:rPr>
+              <a:t>:  [</a:t>
+            </a:r>
+            <a:r>
+              <a:rPr lang="en-US" sz="1050" b="0" i="0" dirty="0">
+                <a:solidFill>
                   <a:schemeClr val="accent2"/>
                 </a:solidFill>
                 <a:effectLst/>
                 <a:latin typeface="Consolas" panose="020B0609020204030204" pitchFamily="49" charset="0"/>
               </a:rPr>
-              <a:t>unit</a:t>
+              <a:t>"temperature"</a:t>
             </a:r>
             <a:r>
               <a:rPr lang="en-US" sz="1050" b="0" i="0" dirty="0">
@@ -16781,237 +17172,43 @@
                 <a:effectLst/>
                 <a:latin typeface="Consolas" panose="020B0609020204030204" pitchFamily="49" charset="0"/>
               </a:rPr>
-              <a:t>: {</a:t>
+              <a:t>, </a:t>
             </a:r>
             <a:r>
               <a:rPr lang="en-US" sz="1050" b="0" i="0" dirty="0">
                 <a:solidFill>
+                  <a:schemeClr val="accent2"/>
+                </a:solidFill>
+                <a:effectLst/>
+                <a:latin typeface="Consolas" panose="020B0609020204030204" pitchFamily="49" charset="0"/>
+              </a:rPr>
+              <a:t>"unit"</a:t>
+            </a:r>
+            <a:r>
+              <a:rPr lang="en-US" sz="1050" b="0" i="0" dirty="0">
+                <a:solidFill>
+                  <a:schemeClr val="accent1"/>
+                </a:solidFill>
+                <a:effectLst/>
+                <a:latin typeface="Consolas" panose="020B0609020204030204" pitchFamily="49" charset="0"/>
+              </a:rPr>
+              <a:t>],</a:t>
+            </a:r>
+          </a:p>
+          <a:p>
+            <a:r>
+              <a:rPr lang="en-US" sz="1050" dirty="0">
+                <a:solidFill>
+                  <a:schemeClr val="accent1"/>
+                </a:solidFill>
+                <a:latin typeface="Consolas" panose="020B0609020204030204" pitchFamily="49" charset="0"/>
+              </a:rPr>
+              <a:t>	</a:t>
+            </a:r>
+            <a:r>
+              <a:rPr lang="en-US" sz="1050" b="0" i="0" dirty="0" err="1">
+                <a:solidFill>
                   <a:schemeClr val="accent5"/>
-                </a:solidFill>
-                <a:effectLst/>
-                <a:latin typeface="Consolas" panose="020B0609020204030204" pitchFamily="49" charset="0"/>
-              </a:rPr>
-              <a:t>type</a:t>
-            </a:r>
-            <a:r>
-              <a:rPr lang="en-US" sz="1050" b="0" i="0" dirty="0">
-                <a:solidFill>
-                  <a:schemeClr val="accent1"/>
-                </a:solidFill>
-                <a:effectLst/>
-                <a:latin typeface="Consolas" panose="020B0609020204030204" pitchFamily="49" charset="0"/>
-              </a:rPr>
-              <a:t>:</a:t>
-            </a:r>
-            <a:r>
-              <a:rPr lang="en-US" sz="1050" b="0" i="0" dirty="0">
-                <a:solidFill>
-                  <a:schemeClr val="accent2"/>
-                </a:solidFill>
-                <a:effectLst/>
-                <a:latin typeface="Consolas" panose="020B0609020204030204" pitchFamily="49" charset="0"/>
-              </a:rPr>
-              <a:t> "string"</a:t>
-            </a:r>
-            <a:r>
-              <a:rPr lang="en-US" sz="1050" b="0" i="0" dirty="0">
-                <a:solidFill>
-                  <a:schemeClr val="accent1"/>
-                </a:solidFill>
-                <a:effectLst/>
-                <a:latin typeface="Consolas" panose="020B0609020204030204" pitchFamily="49" charset="0"/>
-              </a:rPr>
-              <a:t>}, </a:t>
-            </a:r>
-          </a:p>
-          <a:p>
-            <a:r>
-              <a:rPr lang="en-US" sz="1050" dirty="0">
-                <a:solidFill>
-                  <a:schemeClr val="accent1"/>
-                </a:solidFill>
-                <a:latin typeface="Consolas" panose="020B0609020204030204" pitchFamily="49" charset="0"/>
-              </a:rPr>
-              <a:t>		</a:t>
-            </a:r>
-            <a:r>
-              <a:rPr lang="en-US" sz="1050" b="0" i="0" dirty="0">
-                <a:solidFill>
-                  <a:schemeClr val="accent2"/>
-                </a:solidFill>
-                <a:effectLst/>
-                <a:latin typeface="Consolas" panose="020B0609020204030204" pitchFamily="49" charset="0"/>
-              </a:rPr>
-              <a:t>temp</a:t>
-            </a:r>
-            <a:r>
-              <a:rPr lang="tr-TR" sz="1050" b="0" i="0" dirty="0">
-                <a:solidFill>
-                  <a:schemeClr val="accent2"/>
-                </a:solidFill>
-                <a:effectLst/>
-                <a:latin typeface="Consolas" panose="020B0609020204030204" pitchFamily="49" charset="0"/>
-              </a:rPr>
-              <a:t>e</a:t>
-            </a:r>
-            <a:r>
-              <a:rPr lang="en-US" sz="1050" b="0" i="0" dirty="0" err="1">
-                <a:solidFill>
-                  <a:schemeClr val="accent2"/>
-                </a:solidFill>
-                <a:effectLst/>
-                <a:latin typeface="Consolas" panose="020B0609020204030204" pitchFamily="49" charset="0"/>
-              </a:rPr>
-              <a:t>ratureOf</a:t>
-            </a:r>
-            <a:r>
-              <a:rPr lang="en-US" sz="1050" b="0" i="0" dirty="0">
-                <a:solidFill>
-                  <a:schemeClr val="accent1"/>
-                </a:solidFill>
-                <a:effectLst/>
-                <a:latin typeface="Consolas" panose="020B0609020204030204" pitchFamily="49" charset="0"/>
-              </a:rPr>
-              <a:t>: {</a:t>
-            </a:r>
-            <a:r>
-              <a:rPr lang="en-US" sz="1050" b="0" i="0" dirty="0">
-                <a:solidFill>
-                  <a:schemeClr val="accent5"/>
-                </a:solidFill>
-                <a:effectLst/>
-                <a:latin typeface="Consolas" panose="020B0609020204030204" pitchFamily="49" charset="0"/>
-              </a:rPr>
-              <a:t>type</a:t>
-            </a:r>
-            <a:r>
-              <a:rPr lang="en-US" sz="1050" b="0" i="0" dirty="0">
-                <a:solidFill>
-                  <a:schemeClr val="accent1"/>
-                </a:solidFill>
-                <a:effectLst/>
-                <a:latin typeface="Consolas" panose="020B0609020204030204" pitchFamily="49" charset="0"/>
-              </a:rPr>
-              <a:t>: </a:t>
-            </a:r>
-            <a:r>
-              <a:rPr lang="en-US" sz="1050" b="0" i="0" dirty="0">
-                <a:solidFill>
-                  <a:schemeClr val="accent2"/>
-                </a:solidFill>
-                <a:effectLst/>
-                <a:latin typeface="Consolas" panose="020B0609020204030204" pitchFamily="49" charset="0"/>
-              </a:rPr>
-              <a:t>"string"</a:t>
-            </a:r>
-            <a:r>
-              <a:rPr lang="en-US" sz="1050" b="0" i="0" dirty="0">
-                <a:solidFill>
-                  <a:schemeClr val="accent1"/>
-                </a:solidFill>
-                <a:effectLst/>
-                <a:latin typeface="Consolas" panose="020B0609020204030204" pitchFamily="49" charset="0"/>
-              </a:rPr>
-              <a:t>} </a:t>
-            </a:r>
-          </a:p>
-          <a:p>
-            <a:r>
-              <a:rPr lang="en-US" sz="1050" b="0" i="0" dirty="0">
-                <a:solidFill>
-                  <a:schemeClr val="accent1"/>
-                </a:solidFill>
-                <a:effectLst/>
-                <a:latin typeface="Consolas" panose="020B0609020204030204" pitchFamily="49" charset="0"/>
-              </a:rPr>
-              <a:t>},</a:t>
-            </a:r>
-          </a:p>
-          <a:p>
-            <a:r>
-              <a:rPr lang="en-US" sz="1050" dirty="0">
-                <a:solidFill>
-                  <a:schemeClr val="accent1"/>
-                </a:solidFill>
-                <a:latin typeface="Consolas" panose="020B0609020204030204" pitchFamily="49" charset="0"/>
-              </a:rPr>
-              <a:t>	</a:t>
-            </a:r>
-            <a:r>
-              <a:rPr lang="en-US" sz="1050" b="0" i="0" dirty="0">
-                <a:solidFill>
-                  <a:schemeClr val="accent2"/>
-                </a:solidFill>
-                <a:effectLst/>
-                <a:latin typeface="Consolas" panose="020B0609020204030204" pitchFamily="49" charset="0"/>
-              </a:rPr>
-              <a:t>required</a:t>
-            </a:r>
-            <a:r>
-              <a:rPr lang="en-US" sz="1050" b="0" i="0" dirty="0">
-                <a:solidFill>
-                  <a:schemeClr val="accent1"/>
-                </a:solidFill>
-                <a:effectLst/>
-                <a:latin typeface="Consolas" panose="020B0609020204030204" pitchFamily="49" charset="0"/>
-              </a:rPr>
-              <a:t>:  [</a:t>
-            </a:r>
-            <a:r>
-              <a:rPr lang="en-US" sz="1050" b="0" i="0" dirty="0">
-                <a:solidFill>
-                  <a:schemeClr val="accent2"/>
-                </a:solidFill>
-                <a:effectLst/>
-                <a:latin typeface="Consolas" panose="020B0609020204030204" pitchFamily="49" charset="0"/>
-              </a:rPr>
-              <a:t>"temperature"</a:t>
-            </a:r>
-            <a:r>
-              <a:rPr lang="en-US" sz="1050" b="0" i="0" dirty="0">
-                <a:solidFill>
-                  <a:schemeClr val="accent1"/>
-                </a:solidFill>
-                <a:effectLst/>
-                <a:latin typeface="Consolas" panose="020B0609020204030204" pitchFamily="49" charset="0"/>
-              </a:rPr>
-              <a:t>, </a:t>
-            </a:r>
-            <a:r>
-              <a:rPr lang="en-US" sz="1050" b="0" i="0" dirty="0">
-                <a:solidFill>
-                  <a:schemeClr val="accent2"/>
-                </a:solidFill>
-                <a:effectLst/>
-                <a:latin typeface="Consolas" panose="020B0609020204030204" pitchFamily="49" charset="0"/>
-              </a:rPr>
-              <a:t>"unit"</a:t>
-            </a:r>
-            <a:r>
-              <a:rPr lang="en-US" sz="1050" b="0" i="0" dirty="0">
-                <a:solidFill>
-                  <a:schemeClr val="accent1"/>
-                </a:solidFill>
-                <a:effectLst/>
-                <a:latin typeface="Consolas" panose="020B0609020204030204" pitchFamily="49" charset="0"/>
-              </a:rPr>
-              <a:t>],</a:t>
-            </a:r>
-          </a:p>
-          <a:p>
-            <a:r>
-              <a:rPr lang="en-US" sz="1050" dirty="0">
-                <a:solidFill>
-                  <a:schemeClr val="accent1"/>
-                </a:solidFill>
-                <a:latin typeface="Consolas" panose="020B0609020204030204" pitchFamily="49" charset="0"/>
-              </a:rPr>
-              <a:t>	</a:t>
-            </a:r>
-            <a:r>
-              <a:rPr lang="en-US" sz="1050" b="0" i="0" dirty="0" err="1">
-                <a:solidFill>
-                  <a:schemeClr val="accent2"/>
                 </a:solidFill>
                 <a:effectLst/>
                 <a:latin typeface="Consolas" panose="020B0609020204030204" pitchFamily="49" charset="0"/>
@@ -17200,12 +17397,87 @@
             <a:r>
               <a:rPr lang="en-US" sz="1050" b="0" i="0" dirty="0">
                 <a:solidFill>
+                  <a:schemeClr val="accent2">
+                    <a:lumMod val="75000"/>
+                  </a:schemeClr>
+                </a:solidFill>
+                <a:effectLst/>
+                <a:latin typeface="Consolas" panose="020B0609020204030204" pitchFamily="49" charset="0"/>
+              </a:rPr>
+              <a:t>temperature</a:t>
+            </a:r>
+            <a:r>
+              <a:rPr lang="en-US" sz="1050" b="0" i="0" dirty="0">
+                <a:solidFill>
+                  <a:schemeClr val="accent1"/>
+                </a:solidFill>
+                <a:effectLst/>
+                <a:latin typeface="Consolas" panose="020B0609020204030204" pitchFamily="49" charset="0"/>
+              </a:rPr>
+              <a:t>: </a:t>
+            </a:r>
+            <a:r>
+              <a:rPr lang="en-US" sz="1050" b="0" i="0" dirty="0">
+                <a:solidFill>
+                  <a:schemeClr val="accent6"/>
+                </a:solidFill>
+                <a:effectLst/>
+                <a:latin typeface="Consolas" panose="020B0609020204030204" pitchFamily="49" charset="0"/>
+              </a:rPr>
+              <a:t>15.7</a:t>
+            </a:r>
+            <a:r>
+              <a:rPr lang="en-US" sz="1050" b="0" i="0" dirty="0">
+                <a:solidFill>
+                  <a:schemeClr val="accent1"/>
+                </a:solidFill>
+                <a:effectLst/>
+                <a:latin typeface="Consolas" panose="020B0609020204030204" pitchFamily="49" charset="0"/>
+              </a:rPr>
+              <a:t>, 	</a:t>
+            </a:r>
+          </a:p>
+          <a:p>
+            <a:r>
+              <a:rPr lang="en-US" sz="1050" dirty="0">
+                <a:solidFill>
+                  <a:schemeClr val="accent1"/>
+                </a:solidFill>
+                <a:latin typeface="Consolas" panose="020B0609020204030204" pitchFamily="49" charset="0"/>
+              </a:rPr>
+              <a:t>	</a:t>
+            </a:r>
+            <a:r>
+              <a:rPr lang="en-US" sz="1050" b="0" i="0" dirty="0">
+                <a:solidFill>
+                  <a:schemeClr val="accent2">
+                    <a:lumMod val="75000"/>
+                  </a:schemeClr>
+                </a:solidFill>
+                <a:effectLst/>
+                <a:latin typeface="Consolas" panose="020B0609020204030204" pitchFamily="49" charset="0"/>
+              </a:rPr>
+              <a:t>unit</a:t>
+            </a:r>
+            <a:r>
+              <a:rPr lang="en-US" sz="1050" b="0" i="0" dirty="0">
+                <a:solidFill>
+                  <a:schemeClr val="accent1"/>
+                </a:solidFill>
+                <a:effectLst/>
+                <a:latin typeface="Consolas" panose="020B0609020204030204" pitchFamily="49" charset="0"/>
+              </a:rPr>
+              <a:t>: </a:t>
+            </a:r>
+            <a:r>
+              <a:rPr lang="en-US" sz="1050" b="0" i="0" dirty="0">
+                <a:solidFill>
                   <a:schemeClr val="accent2"/>
                 </a:solidFill>
                 <a:effectLst/>
                 <a:latin typeface="Consolas" panose="020B0609020204030204" pitchFamily="49" charset="0"/>
               </a:rPr>
-              <a:t>temperature</a:t>
+              <a:t>"Celsius"</a:t>
             </a:r>
             <a:r>
               <a:rPr lang="en-US" sz="1050" b="0" i="0" dirty="0">
@@ -17215,94 +17487,25 @@
                 <a:effectLst/>
                 <a:latin typeface="Consolas" panose="020B0609020204030204" pitchFamily="49" charset="0"/>
               </a:rPr>
-              <a:t>: </a:t>
+              <a:t>, </a:t>
+            </a:r>
+          </a:p>
+          <a:p>
+            <a:r>
+              <a:rPr lang="en-US" sz="1050" dirty="0">
+                <a:solidFill>
+                  <a:schemeClr val="accent1"/>
+                </a:solidFill>
+                <a:latin typeface="Consolas" panose="020B0609020204030204" pitchFamily="49" charset="0"/>
+              </a:rPr>
+              <a:t>	</a:t>
             </a:r>
             <a:r>
               <a:rPr lang="en-US" sz="1050" b="0" i="0" dirty="0">
                 <a:solidFill>
-                  <a:schemeClr val="accent6"/>
-                </a:solidFill>
-                <a:effectLst/>
-                <a:latin typeface="Consolas" panose="020B0609020204030204" pitchFamily="49" charset="0"/>
-              </a:rPr>
-              <a:t>15.7</a:t>
-            </a:r>
-            <a:r>
-              <a:rPr lang="en-US" sz="1050" b="0" i="0" dirty="0">
-                <a:solidFill>
-                  <a:schemeClr val="accent1"/>
-                </a:solidFill>
-                <a:effectLst/>
-                <a:latin typeface="Consolas" panose="020B0609020204030204" pitchFamily="49" charset="0"/>
-              </a:rPr>
-              <a:t>, 	</a:t>
-            </a:r>
-          </a:p>
-          <a:p>
-            <a:r>
-              <a:rPr lang="en-US" sz="1050" dirty="0">
-                <a:solidFill>
-                  <a:schemeClr val="accent1"/>
-                </a:solidFill>
-                <a:latin typeface="Consolas" panose="020B0609020204030204" pitchFamily="49" charset="0"/>
-              </a:rPr>
-              <a:t>	</a:t>
-            </a:r>
-            <a:r>
-              <a:rPr lang="en-US" sz="1050" b="0" i="0" dirty="0">
-                <a:solidFill>
-                  <a:schemeClr val="accent2"/>
-                </a:solidFill>
-                <a:effectLst/>
-                <a:latin typeface="Consolas" panose="020B0609020204030204" pitchFamily="49" charset="0"/>
-              </a:rPr>
-              <a:t>unit</a:t>
-            </a:r>
-            <a:r>
-              <a:rPr lang="en-US" sz="1050" b="0" i="0" dirty="0">
-                <a:solidFill>
-                  <a:schemeClr val="accent1"/>
-                </a:solidFill>
-                <a:effectLst/>
-                <a:latin typeface="Consolas" panose="020B0609020204030204" pitchFamily="49" charset="0"/>
-              </a:rPr>
-              <a:t>: </a:t>
-            </a:r>
-            <a:r>
-              <a:rPr lang="en-US" sz="1050" b="0" i="0" dirty="0">
-                <a:solidFill>
-                  <a:schemeClr val="accent2"/>
-                </a:solidFill>
-                <a:effectLst/>
-                <a:latin typeface="Consolas" panose="020B0609020204030204" pitchFamily="49" charset="0"/>
-              </a:rPr>
-              <a:t>"Celsius"</a:t>
-            </a:r>
-            <a:r>
-              <a:rPr lang="en-US" sz="1050" b="0" i="0" dirty="0">
-                <a:solidFill>
-                  <a:schemeClr val="accent1"/>
-                </a:solidFill>
-                <a:effectLst/>
-                <a:latin typeface="Consolas" panose="020B0609020204030204" pitchFamily="49" charset="0"/>
-              </a:rPr>
-              <a:t>, </a:t>
-            </a:r>
-          </a:p>
-          <a:p>
-            <a:r>
-              <a:rPr lang="en-US" sz="1050" dirty="0">
-                <a:solidFill>
-                  <a:schemeClr val="accent1"/>
-                </a:solidFill>
-                <a:latin typeface="Consolas" panose="020B0609020204030204" pitchFamily="49" charset="0"/>
-              </a:rPr>
-              <a:t>	</a:t>
-            </a:r>
-            <a:r>
-              <a:rPr lang="en-US" sz="1050" b="0" i="0" dirty="0">
-                <a:solidFill>
-                  <a:schemeClr val="accent2"/>
+                  <a:schemeClr val="accent2">
+                    <a:lumMod val="75000"/>
+                  </a:schemeClr>
                 </a:solidFill>
                 <a:effectLst/>
                 <a:latin typeface="Consolas" panose="020B0609020204030204" pitchFamily="49" charset="0"/>
@@ -17312,7 +17515,9 @@
             <a:r>
               <a:rPr lang="tr-TR" sz="1050" b="0" i="0" dirty="0">
                 <a:solidFill>
-                  <a:schemeClr val="accent2"/>
+                  <a:schemeClr val="accent2">
+                    <a:lumMod val="75000"/>
+                  </a:schemeClr>
                 </a:solidFill>
                 <a:effectLst/>
                 <a:latin typeface="Consolas" panose="020B0609020204030204" pitchFamily="49" charset="0"/>
@@ -17322,7 +17527,9 @@
             <a:r>
               <a:rPr lang="en-US" sz="1050" b="0" i="0" dirty="0" err="1">
                 <a:solidFill>
-                  <a:schemeClr val="accent2"/>
+                  <a:schemeClr val="accent2">
+                    <a:lumMod val="75000"/>
+                  </a:schemeClr>
                 </a:solidFill>
                 <a:effectLst/>
                 <a:latin typeface="Consolas" panose="020B0609020204030204" pitchFamily="49" charset="0"/>
@@ -17387,14 +17594,63 @@
               <a:t> </a:t>
             </a:r>
             <a:r>
+              <a:rPr lang="en-US" sz="1050" dirty="0" err="1">
+                <a:solidFill>
+                  <a:schemeClr val="tx2"/>
+                </a:solidFill>
+                <a:latin typeface="Consolas" panose="020B0609020204030204" pitchFamily="49" charset="0"/>
+              </a:rPr>
+              <a:t>isV</a:t>
+            </a:r>
+            <a:r>
+              <a:rPr lang="en-US" sz="1050" b="0" i="0" dirty="0" err="1">
+                <a:solidFill>
+                  <a:schemeClr val="tx2"/>
+                </a:solidFill>
+                <a:effectLst/>
+                <a:latin typeface="Consolas" panose="020B0609020204030204" pitchFamily="49" charset="0"/>
+              </a:rPr>
+              <a:t>alid</a:t>
+            </a:r>
+            <a:r>
               <a:rPr lang="en-US" sz="1050" b="0" i="0" dirty="0">
                 <a:solidFill>
+                  <a:schemeClr val="accent1"/>
+                </a:solidFill>
+                <a:effectLst/>
+                <a:latin typeface="Consolas" panose="020B0609020204030204" pitchFamily="49" charset="0"/>
+              </a:rPr>
+              <a:t> = </a:t>
+            </a:r>
+            <a:r>
+              <a:rPr lang="en-US" sz="1050" b="0" i="0" dirty="0">
+                <a:solidFill>
+                  <a:schemeClr val="accent5"/>
+                </a:solidFill>
+                <a:effectLst/>
+                <a:latin typeface="Consolas" panose="020B0609020204030204" pitchFamily="49" charset="0"/>
+              </a:rPr>
+              <a:t>validate</a:t>
+            </a:r>
+            <a:r>
+              <a:rPr lang="en-US" sz="1050" b="0" i="0" dirty="0">
+                <a:solidFill>
+                  <a:schemeClr val="accent1"/>
+                </a:solidFill>
+                <a:effectLst/>
+                <a:latin typeface="Consolas" panose="020B0609020204030204" pitchFamily="49" charset="0"/>
+              </a:rPr>
+              <a:t>(</a:t>
+            </a:r>
+            <a:r>
+              <a:rPr lang="en-US" sz="1050" b="0" i="0" dirty="0">
+                <a:solidFill>
                   <a:schemeClr val="tx2"/>
                 </a:solidFill>
                 <a:effectLst/>
                 <a:latin typeface="Consolas" panose="020B0609020204030204" pitchFamily="49" charset="0"/>
               </a:rPr>
-              <a:t>valid</a:t>
+              <a:t>data</a:t>
             </a:r>
             <a:r>
               <a:rPr lang="en-US" sz="1050" b="0" i="0" dirty="0">
@@ -17404,69 +17660,38 @@
                 <a:effectLst/>
                 <a:latin typeface="Consolas" panose="020B0609020204030204" pitchFamily="49" charset="0"/>
               </a:rPr>
-              <a:t> = </a:t>
-            </a:r>
+              <a:t>) </a:t>
+            </a:r>
+          </a:p>
+          <a:p>
             <a:r>
               <a:rPr lang="en-US" sz="1050" b="0" i="0" dirty="0">
                 <a:solidFill>
-                  <a:schemeClr val="accent5"/>
-                </a:solidFill>
-                <a:effectLst/>
-                <a:latin typeface="Consolas" panose="020B0609020204030204" pitchFamily="49" charset="0"/>
-              </a:rPr>
-              <a:t>validate</a:t>
-            </a:r>
-            <a:r>
-              <a:rPr lang="en-US" sz="1050" b="0" i="0" dirty="0">
-                <a:solidFill>
                   <a:schemeClr val="accent1"/>
                 </a:solidFill>
                 <a:effectLst/>
                 <a:latin typeface="Consolas" panose="020B0609020204030204" pitchFamily="49" charset="0"/>
               </a:rPr>
-              <a:t>(</a:t>
-            </a:r>
-            <a:r>
-              <a:rPr lang="en-US" sz="1050" b="0" i="0" dirty="0">
+              <a:t>if (</a:t>
+            </a:r>
+            <a:r>
+              <a:rPr lang="en-US" sz="1050" dirty="0" err="1">
                 <a:solidFill>
                   <a:schemeClr val="tx2"/>
                 </a:solidFill>
-                <a:effectLst/>
-                <a:latin typeface="Consolas" panose="020B0609020204030204" pitchFamily="49" charset="0"/>
-              </a:rPr>
-              <a:t>data</a:t>
-            </a:r>
-            <a:r>
-              <a:rPr lang="en-US" sz="1050" b="0" i="0" dirty="0">
-                <a:solidFill>
-                  <a:schemeClr val="accent1"/>
-                </a:solidFill>
-                <a:effectLst/>
-                <a:latin typeface="Consolas" panose="020B0609020204030204" pitchFamily="49" charset="0"/>
-              </a:rPr>
-              <a:t>) </a:t>
-            </a:r>
-          </a:p>
-          <a:p>
-            <a:r>
-              <a:rPr lang="en-US" sz="1050" b="0" i="0" dirty="0">
-                <a:solidFill>
-                  <a:schemeClr val="accent1"/>
-                </a:solidFill>
-                <a:effectLst/>
-                <a:latin typeface="Consolas" panose="020B0609020204030204" pitchFamily="49" charset="0"/>
-              </a:rPr>
-              <a:t>if (</a:t>
-            </a:r>
-            <a:r>
-              <a:rPr lang="en-US" sz="1050" b="0" i="0" dirty="0">
+                <a:latin typeface="Consolas" panose="020B0609020204030204" pitchFamily="49" charset="0"/>
+              </a:rPr>
+              <a:t>isV</a:t>
+            </a:r>
+            <a:r>
+              <a:rPr lang="en-US" sz="1050" b="0" i="0" dirty="0" err="1">
                 <a:solidFill>
                   <a:schemeClr val="tx2"/>
                 </a:solidFill>
                 <a:effectLst/>
                 <a:latin typeface="Consolas" panose="020B0609020204030204" pitchFamily="49" charset="0"/>
               </a:rPr>
-              <a:t>valid</a:t>
+              <a:t>alid</a:t>
             </a:r>
             <a:r>
               <a:rPr lang="en-US" sz="1050" b="0" i="0" dirty="0">
@@ -18898,11 +19123,331 @@
             <a:r>
               <a:rPr lang="en-US" sz="1300" b="0" dirty="0">
                 <a:solidFill>
+                  <a:schemeClr val="accent2">
+                    <a:lumMod val="75000"/>
+                  </a:schemeClr>
+                </a:solidFill>
+                <a:effectLst/>
+                <a:latin typeface="Consolas" panose="020B0609020204030204" pitchFamily="49" charset="0"/>
+              </a:rPr>
+              <a:t>"temperature"</a:t>
+            </a:r>
+            <a:r>
+              <a:rPr lang="en-US" sz="1300" b="0" dirty="0">
+                <a:solidFill>
+                  <a:schemeClr val="accent1"/>
+                </a:solidFill>
+                <a:effectLst/>
+                <a:latin typeface="Consolas" panose="020B0609020204030204" pitchFamily="49" charset="0"/>
+              </a:rPr>
+              <a:t>: {</a:t>
+            </a:r>
+            <a:r>
+              <a:rPr lang="en-US" sz="1300" b="0" dirty="0">
+                <a:solidFill>
+                  <a:schemeClr val="accent5"/>
+                </a:solidFill>
+                <a:effectLst/>
+                <a:latin typeface="Consolas" panose="020B0609020204030204" pitchFamily="49" charset="0"/>
+              </a:rPr>
+              <a:t>"</a:t>
+            </a:r>
+            <a:r>
+              <a:rPr lang="en-US" sz="1300" b="0" dirty="0" err="1">
+                <a:solidFill>
+                  <a:schemeClr val="accent5"/>
+                </a:solidFill>
+                <a:effectLst/>
+                <a:latin typeface="Consolas" panose="020B0609020204030204" pitchFamily="49" charset="0"/>
+              </a:rPr>
+              <a:t>type"</a:t>
+            </a:r>
+            <a:r>
+              <a:rPr lang="en-US" sz="1300" b="0" dirty="0" err="1">
+                <a:solidFill>
+                  <a:schemeClr val="accent1"/>
+                </a:solidFill>
+                <a:effectLst/>
+                <a:latin typeface="Consolas" panose="020B0609020204030204" pitchFamily="49" charset="0"/>
+              </a:rPr>
+              <a:t>:</a:t>
+            </a:r>
+            <a:r>
+              <a:rPr lang="en-US" sz="1300" b="0" dirty="0" err="1">
+                <a:solidFill>
                   <a:schemeClr val="accent2"/>
                 </a:solidFill>
                 <a:effectLst/>
                 <a:latin typeface="Consolas" panose="020B0609020204030204" pitchFamily="49" charset="0"/>
               </a:rPr>
+              <a:t>"number</a:t>
+            </a:r>
+            <a:r>
+              <a:rPr lang="en-US" sz="1300" b="0" dirty="0">
+                <a:solidFill>
+                  <a:schemeClr val="accent2"/>
+                </a:solidFill>
+                <a:effectLst/>
+                <a:latin typeface="Consolas" panose="020B0609020204030204" pitchFamily="49" charset="0"/>
+              </a:rPr>
+              <a:t>"</a:t>
+            </a:r>
+            <a:r>
+              <a:rPr lang="en-US" sz="1300" b="0" dirty="0">
+                <a:solidFill>
+                  <a:schemeClr val="accent1"/>
+                </a:solidFill>
+                <a:effectLst/>
+                <a:latin typeface="Consolas" panose="020B0609020204030204" pitchFamily="49" charset="0"/>
+              </a:rPr>
+              <a:t>},</a:t>
+            </a:r>
+          </a:p>
+          <a:p>
+            <a:r>
+              <a:rPr lang="en-US" sz="1300" b="0" dirty="0">
+                <a:solidFill>
+                  <a:schemeClr val="accent1"/>
+                </a:solidFill>
+                <a:effectLst/>
+                <a:latin typeface="Consolas" panose="020B0609020204030204" pitchFamily="49" charset="0"/>
+              </a:rPr>
+              <a:t>        </a:t>
+            </a:r>
+            <a:r>
+              <a:rPr lang="en-US" sz="1300" b="0" dirty="0">
+                <a:solidFill>
+                  <a:schemeClr val="accent2">
+                    <a:lumMod val="75000"/>
+                  </a:schemeClr>
+                </a:solidFill>
+                <a:effectLst/>
+                <a:latin typeface="Consolas" panose="020B0609020204030204" pitchFamily="49" charset="0"/>
+              </a:rPr>
+              <a:t>"unit"</a:t>
+            </a:r>
+            <a:r>
+              <a:rPr lang="en-US" sz="1300" b="0" dirty="0">
+                <a:solidFill>
+                  <a:schemeClr val="accent1"/>
+                </a:solidFill>
+                <a:effectLst/>
+                <a:latin typeface="Consolas" panose="020B0609020204030204" pitchFamily="49" charset="0"/>
+              </a:rPr>
+              <a:t>: {</a:t>
+            </a:r>
+            <a:r>
+              <a:rPr lang="en-US" sz="1300" b="0" dirty="0">
+                <a:solidFill>
+                  <a:schemeClr val="accent5"/>
+                </a:solidFill>
+                <a:effectLst/>
+                <a:latin typeface="Consolas" panose="020B0609020204030204" pitchFamily="49" charset="0"/>
+              </a:rPr>
+              <a:t>"type"</a:t>
+            </a:r>
+            <a:r>
+              <a:rPr lang="en-US" sz="1300" b="0" dirty="0">
+                <a:solidFill>
+                  <a:schemeClr val="accent1"/>
+                </a:solidFill>
+                <a:effectLst/>
+                <a:latin typeface="Consolas" panose="020B0609020204030204" pitchFamily="49" charset="0"/>
+              </a:rPr>
+              <a:t>: </a:t>
+            </a:r>
+            <a:r>
+              <a:rPr lang="en-US" sz="1300" b="0" dirty="0">
+                <a:solidFill>
+                  <a:schemeClr val="accent2"/>
+                </a:solidFill>
+                <a:effectLst/>
+                <a:latin typeface="Consolas" panose="020B0609020204030204" pitchFamily="49" charset="0"/>
+              </a:rPr>
+              <a:t>"string"</a:t>
+            </a:r>
+            <a:r>
+              <a:rPr lang="en-US" sz="1300" b="0" dirty="0">
+                <a:solidFill>
+                  <a:schemeClr val="accent1"/>
+                </a:solidFill>
+                <a:effectLst/>
+                <a:latin typeface="Consolas" panose="020B0609020204030204" pitchFamily="49" charset="0"/>
+              </a:rPr>
+              <a:t>}, </a:t>
+            </a:r>
+          </a:p>
+          <a:p>
+            <a:r>
+              <a:rPr lang="en-US" sz="1300" b="0" dirty="0">
+                <a:solidFill>
+                  <a:schemeClr val="accent1"/>
+                </a:solidFill>
+                <a:effectLst/>
+                <a:latin typeface="Consolas" panose="020B0609020204030204" pitchFamily="49" charset="0"/>
+              </a:rPr>
+              <a:t>        </a:t>
+            </a:r>
+            <a:r>
+              <a:rPr lang="en-US" sz="1300" b="0" dirty="0">
+                <a:solidFill>
+                  <a:schemeClr val="accent2">
+                    <a:lumMod val="75000"/>
+                  </a:schemeClr>
+                </a:solidFill>
+                <a:effectLst/>
+                <a:latin typeface="Consolas" panose="020B0609020204030204" pitchFamily="49" charset="0"/>
+              </a:rPr>
+              <a:t>"temp</a:t>
+            </a:r>
+            <a:r>
+              <a:rPr lang="tr-TR" sz="1300" b="0" dirty="0">
+                <a:solidFill>
+                  <a:schemeClr val="accent2">
+                    <a:lumMod val="75000"/>
+                  </a:schemeClr>
+                </a:solidFill>
+                <a:effectLst/>
+                <a:latin typeface="Consolas" panose="020B0609020204030204" pitchFamily="49" charset="0"/>
+              </a:rPr>
+              <a:t>e</a:t>
+            </a:r>
+            <a:r>
+              <a:rPr lang="en-US" sz="1300" b="0" dirty="0" err="1">
+                <a:solidFill>
+                  <a:schemeClr val="accent2">
+                    <a:lumMod val="75000"/>
+                  </a:schemeClr>
+                </a:solidFill>
+                <a:effectLst/>
+                <a:latin typeface="Consolas" panose="020B0609020204030204" pitchFamily="49" charset="0"/>
+              </a:rPr>
+              <a:t>ratureOf</a:t>
+            </a:r>
+            <a:r>
+              <a:rPr lang="en-US" sz="1300" b="0" dirty="0">
+                <a:solidFill>
+                  <a:schemeClr val="accent2">
+                    <a:lumMod val="75000"/>
+                  </a:schemeClr>
+                </a:solidFill>
+                <a:effectLst/>
+                <a:latin typeface="Consolas" panose="020B0609020204030204" pitchFamily="49" charset="0"/>
+              </a:rPr>
+              <a:t>"</a:t>
+            </a:r>
+            <a:r>
+              <a:rPr lang="en-US" sz="1300" b="0" dirty="0">
+                <a:solidFill>
+                  <a:schemeClr val="accent1"/>
+                </a:solidFill>
+                <a:effectLst/>
+                <a:latin typeface="Consolas" panose="020B0609020204030204" pitchFamily="49" charset="0"/>
+              </a:rPr>
+              <a:t>:{</a:t>
+            </a:r>
+            <a:r>
+              <a:rPr lang="en-US" sz="1300" b="0" dirty="0">
+                <a:solidFill>
+                  <a:schemeClr val="accent5"/>
+                </a:solidFill>
+                <a:effectLst/>
+                <a:latin typeface="Consolas" panose="020B0609020204030204" pitchFamily="49" charset="0"/>
+              </a:rPr>
+              <a:t>"type"</a:t>
+            </a:r>
+            <a:r>
+              <a:rPr lang="en-US" sz="1300" b="0" dirty="0">
+                <a:solidFill>
+                  <a:schemeClr val="accent1"/>
+                </a:solidFill>
+                <a:effectLst/>
+                <a:latin typeface="Consolas" panose="020B0609020204030204" pitchFamily="49" charset="0"/>
+              </a:rPr>
+              <a:t>: </a:t>
+            </a:r>
+            <a:r>
+              <a:rPr lang="en-US" sz="1300" b="0" dirty="0">
+                <a:solidFill>
+                  <a:schemeClr val="accent2"/>
+                </a:solidFill>
+                <a:effectLst/>
+                <a:latin typeface="Consolas" panose="020B0609020204030204" pitchFamily="49" charset="0"/>
+              </a:rPr>
+              <a:t>"string"</a:t>
+            </a:r>
+            <a:r>
+              <a:rPr lang="en-US" sz="1300" b="0" dirty="0">
+                <a:solidFill>
+                  <a:schemeClr val="accent1"/>
+                </a:solidFill>
+                <a:effectLst/>
+                <a:latin typeface="Consolas" panose="020B0609020204030204" pitchFamily="49" charset="0"/>
+              </a:rPr>
+              <a:t>} </a:t>
+            </a:r>
+          </a:p>
+          <a:p>
+            <a:r>
+              <a:rPr lang="en-US" sz="1300" b="0" dirty="0">
+                <a:solidFill>
+                  <a:schemeClr val="accent1"/>
+                </a:solidFill>
+                <a:effectLst/>
+                <a:latin typeface="Consolas" panose="020B0609020204030204" pitchFamily="49" charset="0"/>
+              </a:rPr>
+              <a:t>    },</a:t>
+            </a:r>
+          </a:p>
+          <a:p>
+            <a:r>
+              <a:rPr lang="en-US" sz="1300" b="0" dirty="0">
+                <a:solidFill>
+                  <a:schemeClr val="accent1"/>
+                </a:solidFill>
+                <a:effectLst/>
+                <a:latin typeface="Consolas" panose="020B0609020204030204" pitchFamily="49" charset="0"/>
+              </a:rPr>
+              <a:t>   </a:t>
+            </a:r>
+            <a:r>
+              <a:rPr lang="en-US" sz="1300" b="0" dirty="0">
+                <a:solidFill>
+                  <a:schemeClr val="accent2"/>
+                </a:solidFill>
+                <a:effectLst/>
+                <a:latin typeface="Consolas" panose="020B0609020204030204" pitchFamily="49" charset="0"/>
+              </a:rPr>
+              <a:t> </a:t>
+            </a:r>
+            <a:r>
+              <a:rPr lang="en-US" sz="1300" b="0" dirty="0">
+                <a:solidFill>
+                  <a:schemeClr val="accent5"/>
+                </a:solidFill>
+                <a:effectLst/>
+                <a:latin typeface="Consolas" panose="020B0609020204030204" pitchFamily="49" charset="0"/>
+              </a:rPr>
+              <a:t>"required"</a:t>
+            </a:r>
+            <a:r>
+              <a:rPr lang="en-US" sz="1300" b="0" dirty="0">
+                <a:solidFill>
+                  <a:schemeClr val="accent1"/>
+                </a:solidFill>
+                <a:effectLst/>
+                <a:latin typeface="Consolas" panose="020B0609020204030204" pitchFamily="49" charset="0"/>
+              </a:rPr>
+              <a:t>:  [</a:t>
+            </a:r>
+            <a:r>
+              <a:rPr lang="en-US" sz="1300" b="0" dirty="0">
+                <a:solidFill>
+                  <a:schemeClr val="accent2"/>
+                </a:solidFill>
+                <a:effectLst/>
+                <a:latin typeface="Consolas" panose="020B0609020204030204" pitchFamily="49" charset="0"/>
+              </a:rPr>
               <a:t>"temperature"</a:t>
             </a:r>
             <a:r>
@@ -18913,11 +19458,43 @@
                 <a:effectLst/>
                 <a:latin typeface="Consolas" panose="020B0609020204030204" pitchFamily="49" charset="0"/>
               </a:rPr>
-              <a:t>: {</a:t>
+              <a:t>, </a:t>
             </a:r>
             <a:r>
               <a:rPr lang="en-US" sz="1300" b="0" dirty="0">
                 <a:solidFill>
+                  <a:schemeClr val="accent2"/>
+                </a:solidFill>
+                <a:effectLst/>
+                <a:latin typeface="Consolas" panose="020B0609020204030204" pitchFamily="49" charset="0"/>
+              </a:rPr>
+              <a:t>"unit"</a:t>
+            </a:r>
+            <a:r>
+              <a:rPr lang="en-US" sz="1300" b="0" dirty="0">
+                <a:solidFill>
+                  <a:schemeClr val="accent1"/>
+                </a:solidFill>
+                <a:effectLst/>
+                <a:latin typeface="Consolas" panose="020B0609020204030204" pitchFamily="49" charset="0"/>
+              </a:rPr>
+              <a:t>],</a:t>
+            </a:r>
+          </a:p>
+          <a:p>
+            <a:r>
+              <a:rPr lang="en-US" sz="1300" b="0" dirty="0">
+                <a:solidFill>
+                  <a:schemeClr val="accent1"/>
+                </a:solidFill>
+                <a:effectLst/>
+                <a:latin typeface="Consolas" panose="020B0609020204030204" pitchFamily="49" charset="0"/>
+              </a:rPr>
+              <a:t>    </a:t>
+            </a:r>
+            <a:r>
+              <a:rPr lang="en-US" sz="1300" b="0" dirty="0">
+                <a:solidFill>
                   <a:schemeClr val="accent5"/>
                 </a:solidFill>
                 <a:effectLst/>
@@ -18933,342 +19510,12 @@
                 <a:effectLst/>
                 <a:latin typeface="Consolas" panose="020B0609020204030204" pitchFamily="49" charset="0"/>
               </a:rPr>
-              <a:t>type"</a:t>
-            </a:r>
-            <a:r>
-              <a:rPr lang="en-US" sz="1300" b="0" dirty="0" err="1">
-                <a:solidFill>
-                  <a:schemeClr val="accent1"/>
-                </a:solidFill>
-                <a:effectLst/>
-                <a:latin typeface="Consolas" panose="020B0609020204030204" pitchFamily="49" charset="0"/>
-              </a:rPr>
-              <a:t>:</a:t>
-            </a:r>
-            <a:r>
-              <a:rPr lang="en-US" sz="1300" b="0" dirty="0" err="1">
-                <a:solidFill>
-                  <a:schemeClr val="accent2"/>
-                </a:solidFill>
-                <a:effectLst/>
-                <a:latin typeface="Consolas" panose="020B0609020204030204" pitchFamily="49" charset="0"/>
-              </a:rPr>
-              <a:t>"number</a:t>
+              <a:t>additionalProperties</a:t>
             </a:r>
             <a:r>
               <a:rPr lang="en-US" sz="1300" b="0" dirty="0">
                 <a:solidFill>
-                  <a:schemeClr val="accent2"/>
-                </a:solidFill>
-                <a:effectLst/>
-                <a:latin typeface="Consolas" panose="020B0609020204030204" pitchFamily="49" charset="0"/>
-              </a:rPr>
-              <a:t>"</a:t>
-            </a:r>
-            <a:r>
-              <a:rPr lang="en-US" sz="1300" b="0" dirty="0">
-                <a:solidFill>
-                  <a:schemeClr val="accent1"/>
-                </a:solidFill>
-                <a:effectLst/>
-                <a:latin typeface="Consolas" panose="020B0609020204030204" pitchFamily="49" charset="0"/>
-              </a:rPr>
-              <a:t>},</a:t>
-            </a:r>
-          </a:p>
-          <a:p>
-            <a:r>
-              <a:rPr lang="en-US" sz="1300" b="0" dirty="0">
-                <a:solidFill>
-                  <a:schemeClr val="accent1"/>
-                </a:solidFill>
-                <a:effectLst/>
-                <a:latin typeface="Consolas" panose="020B0609020204030204" pitchFamily="49" charset="0"/>
-              </a:rPr>
-              <a:t>        </a:t>
-            </a:r>
-            <a:r>
-              <a:rPr lang="en-US" sz="1300" b="0" dirty="0">
-                <a:solidFill>
-                  <a:schemeClr val="accent2"/>
-                </a:solidFill>
-                <a:effectLst/>
-                <a:latin typeface="Consolas" panose="020B0609020204030204" pitchFamily="49" charset="0"/>
-              </a:rPr>
-              <a:t>"unit"</a:t>
-            </a:r>
-            <a:r>
-              <a:rPr lang="en-US" sz="1300" b="0" dirty="0">
-                <a:solidFill>
-                  <a:schemeClr val="accent1"/>
-                </a:solidFill>
-                <a:effectLst/>
-                <a:latin typeface="Consolas" panose="020B0609020204030204" pitchFamily="49" charset="0"/>
-              </a:rPr>
-              <a:t>: {</a:t>
-            </a:r>
-            <a:r>
-              <a:rPr lang="en-US" sz="1300" b="0" dirty="0">
-                <a:solidFill>
                   <a:schemeClr val="accent5"/>
-                </a:solidFill>
-                <a:effectLst/>
-                <a:latin typeface="Consolas" panose="020B0609020204030204" pitchFamily="49" charset="0"/>
-              </a:rPr>
-              <a:t>"type"</a:t>
-            </a:r>
-            <a:r>
-              <a:rPr lang="en-US" sz="1300" b="0" dirty="0">
-                <a:solidFill>
-                  <a:schemeClr val="accent1"/>
-                </a:solidFill>
-                <a:effectLst/>
-                <a:latin typeface="Consolas" panose="020B0609020204030204" pitchFamily="49" charset="0"/>
-              </a:rPr>
-              <a:t>: </a:t>
-            </a:r>
-            <a:r>
-              <a:rPr lang="en-US" sz="1300" b="0" dirty="0">
-                <a:solidFill>
-                  <a:schemeClr val="accent2"/>
-                </a:solidFill>
-                <a:effectLst/>
-                <a:latin typeface="Consolas" panose="020B0609020204030204" pitchFamily="49" charset="0"/>
-              </a:rPr>
-              <a:t>"string"</a:t>
-            </a:r>
-            <a:r>
-              <a:rPr lang="en-US" sz="1300" b="0" dirty="0">
-                <a:solidFill>
-                  <a:schemeClr val="accent1"/>
-                </a:solidFill>
-                <a:effectLst/>
-                <a:latin typeface="Consolas" panose="020B0609020204030204" pitchFamily="49" charset="0"/>
-              </a:rPr>
-              <a:t>}, </a:t>
-            </a:r>
-          </a:p>
-          <a:p>
-            <a:r>
-              <a:rPr lang="en-US" sz="1300" b="0" dirty="0">
-                <a:solidFill>
-                  <a:schemeClr val="accent1"/>
-                </a:solidFill>
-                <a:effectLst/>
-                <a:latin typeface="Consolas" panose="020B0609020204030204" pitchFamily="49" charset="0"/>
-              </a:rPr>
-              <a:t>        </a:t>
-            </a:r>
-            <a:r>
-              <a:rPr lang="en-US" sz="1300" b="0" dirty="0">
-                <a:solidFill>
-                  <a:schemeClr val="accent2"/>
-                </a:solidFill>
-                <a:effectLst/>
-                <a:latin typeface="Consolas" panose="020B0609020204030204" pitchFamily="49" charset="0"/>
-              </a:rPr>
-              <a:t>"temp</a:t>
-            </a:r>
-            <a:r>
-              <a:rPr lang="tr-TR" sz="1300" b="0" dirty="0">
-                <a:solidFill>
-                  <a:schemeClr val="accent2"/>
-                </a:solidFill>
-                <a:effectLst/>
-                <a:latin typeface="Consolas" panose="020B0609020204030204" pitchFamily="49" charset="0"/>
-              </a:rPr>
-              <a:t>e</a:t>
-            </a:r>
-            <a:r>
-              <a:rPr lang="en-US" sz="1300" b="0" dirty="0" err="1">
-                <a:solidFill>
-                  <a:schemeClr val="accent2"/>
-                </a:solidFill>
-                <a:effectLst/>
-                <a:latin typeface="Consolas" panose="020B0609020204030204" pitchFamily="49" charset="0"/>
-              </a:rPr>
-              <a:t>ratureOf</a:t>
-            </a:r>
-            <a:r>
-              <a:rPr lang="en-US" sz="1300" b="0" dirty="0">
-                <a:solidFill>
-                  <a:schemeClr val="accent2"/>
-                </a:solidFill>
-                <a:effectLst/>
-                <a:latin typeface="Consolas" panose="020B0609020204030204" pitchFamily="49" charset="0"/>
-              </a:rPr>
-              <a:t>"</a:t>
-            </a:r>
-            <a:r>
-              <a:rPr lang="en-US" sz="1300" b="0" dirty="0">
-                <a:solidFill>
-                  <a:schemeClr val="accent1"/>
-                </a:solidFill>
-                <a:effectLst/>
-                <a:latin typeface="Consolas" panose="020B0609020204030204" pitchFamily="49" charset="0"/>
-              </a:rPr>
-              <a:t>:{</a:t>
-            </a:r>
-            <a:r>
-              <a:rPr lang="en-US" sz="1300" b="0" dirty="0">
-                <a:solidFill>
-                  <a:schemeClr val="accent5"/>
-                </a:solidFill>
-                <a:effectLst/>
-                <a:latin typeface="Consolas" panose="020B0609020204030204" pitchFamily="49" charset="0"/>
-              </a:rPr>
-              <a:t>"type"</a:t>
-            </a:r>
-            <a:r>
-              <a:rPr lang="en-US" sz="1300" b="0" dirty="0">
-                <a:solidFill>
-                  <a:schemeClr val="accent1"/>
-                </a:solidFill>
-                <a:effectLst/>
-                <a:latin typeface="Consolas" panose="020B0609020204030204" pitchFamily="49" charset="0"/>
-              </a:rPr>
-              <a:t>: </a:t>
-            </a:r>
-            <a:r>
-              <a:rPr lang="en-US" sz="1300" b="0" dirty="0">
-                <a:solidFill>
-                  <a:schemeClr val="accent2"/>
-                </a:solidFill>
-                <a:effectLst/>
-                <a:latin typeface="Consolas" panose="020B0609020204030204" pitchFamily="49" charset="0"/>
-              </a:rPr>
-              <a:t>"string"</a:t>
-            </a:r>
-            <a:r>
-              <a:rPr lang="en-US" sz="1300" b="0" dirty="0">
-                <a:solidFill>
-                  <a:schemeClr val="accent1"/>
-                </a:solidFill>
-                <a:effectLst/>
-                <a:latin typeface="Consolas" panose="020B0609020204030204" pitchFamily="49" charset="0"/>
-              </a:rPr>
-              <a:t>} </a:t>
-            </a:r>
-          </a:p>
-          <a:p>
-            <a:r>
-              <a:rPr lang="en-US" sz="1300" b="0" dirty="0">
-                <a:solidFill>
-                  <a:schemeClr val="accent1"/>
-                </a:solidFill>
-                <a:effectLst/>
-                <a:latin typeface="Consolas" panose="020B0609020204030204" pitchFamily="49" charset="0"/>
-              </a:rPr>
-              <a:t>    },</a:t>
-            </a:r>
-          </a:p>
-          <a:p>
-            <a:r>
-              <a:rPr lang="en-US" sz="1300" b="0" dirty="0">
-                <a:solidFill>
-                  <a:schemeClr val="accent1"/>
-                </a:solidFill>
-                <a:effectLst/>
-                <a:latin typeface="Consolas" panose="020B0609020204030204" pitchFamily="49" charset="0"/>
-              </a:rPr>
-              <a:t>   </a:t>
-            </a:r>
-            <a:r>
-              <a:rPr lang="en-US" sz="1300" b="0" dirty="0">
-                <a:solidFill>
-                  <a:schemeClr val="accent2"/>
-                </a:solidFill>
-                <a:effectLst/>
-                <a:latin typeface="Consolas" panose="020B0609020204030204" pitchFamily="49" charset="0"/>
-              </a:rPr>
-              <a:t> "required"</a:t>
-            </a:r>
-            <a:r>
-              <a:rPr lang="en-US" sz="1300" b="0" dirty="0">
-                <a:solidFill>
-                  <a:schemeClr val="accent1"/>
-                </a:solidFill>
-                <a:effectLst/>
-                <a:latin typeface="Consolas" panose="020B0609020204030204" pitchFamily="49" charset="0"/>
-              </a:rPr>
-              <a:t>:  [</a:t>
-            </a:r>
-            <a:r>
-              <a:rPr lang="en-US" sz="1300" b="0" dirty="0">
-                <a:solidFill>
-                  <a:schemeClr val="accent2"/>
-                </a:solidFill>
-                <a:effectLst/>
-                <a:latin typeface="Consolas" panose="020B0609020204030204" pitchFamily="49" charset="0"/>
-              </a:rPr>
-              <a:t>"temperature"</a:t>
-            </a:r>
-            <a:r>
-              <a:rPr lang="en-US" sz="1300" b="0" dirty="0">
-                <a:solidFill>
-                  <a:schemeClr val="accent1"/>
-                </a:solidFill>
-                <a:effectLst/>
-                <a:latin typeface="Consolas" panose="020B0609020204030204" pitchFamily="49" charset="0"/>
-              </a:rPr>
-              <a:t>, </a:t>
-            </a:r>
-            <a:r>
-              <a:rPr lang="en-US" sz="1300" b="0" dirty="0">
-                <a:solidFill>
-                  <a:schemeClr val="accent2"/>
-                </a:solidFill>
-                <a:effectLst/>
-                <a:latin typeface="Consolas" panose="020B0609020204030204" pitchFamily="49" charset="0"/>
-              </a:rPr>
-              <a:t>"unit"</a:t>
-            </a:r>
-            <a:r>
-              <a:rPr lang="en-US" sz="1300" b="0" dirty="0">
-                <a:solidFill>
-                  <a:schemeClr val="accent1"/>
-                </a:solidFill>
-                <a:effectLst/>
-                <a:latin typeface="Consolas" panose="020B0609020204030204" pitchFamily="49" charset="0"/>
-              </a:rPr>
-              <a:t>],</a:t>
-            </a:r>
-          </a:p>
-          <a:p>
-            <a:r>
-              <a:rPr lang="en-US" sz="1300" b="0" dirty="0">
-                <a:solidFill>
-                  <a:schemeClr val="accent1"/>
-                </a:solidFill>
-                <a:effectLst/>
-                <a:latin typeface="Consolas" panose="020B0609020204030204" pitchFamily="49" charset="0"/>
-              </a:rPr>
-              <a:t>    </a:t>
-            </a:r>
-            <a:r>
-              <a:rPr lang="en-US" sz="1300" b="0" dirty="0">
-                <a:solidFill>
-                  <a:schemeClr val="accent2"/>
-                </a:solidFill>
-                <a:effectLst/>
-                <a:latin typeface="Consolas" panose="020B0609020204030204" pitchFamily="49" charset="0"/>
-              </a:rPr>
-              <a:t>"</a:t>
-            </a:r>
-            <a:r>
-              <a:rPr lang="en-US" sz="1300" b="0" dirty="0" err="1">
-                <a:solidFill>
-                  <a:schemeClr val="accent2"/>
-                </a:solidFill>
-                <a:effectLst/>
-                <a:latin typeface="Consolas" panose="020B0609020204030204" pitchFamily="49" charset="0"/>
-              </a:rPr>
-              <a:t>additionalProperties</a:t>
-            </a:r>
-            <a:r>
-              <a:rPr lang="en-US" sz="1300" b="0" dirty="0">
-                <a:solidFill>
-                  <a:schemeClr val="accent2"/>
                 </a:solidFill>
                 <a:effectLst/>
                 <a:latin typeface="Consolas" panose="020B0609020204030204" pitchFamily="49" charset="0"/>
@@ -19378,11 +19625,23 @@
                 <a:effectLst/>
                 <a:latin typeface="Consolas" panose="020B0609020204030204" pitchFamily="49" charset="0"/>
               </a:rPr>
-              <a:t> "temperature"</a:t>
+              <a:t> </a:t>
             </a:r>
             <a:r>
               <a:rPr lang="en-US" sz="1300" b="0" dirty="0">
                 <a:solidFill>
+                  <a:schemeClr val="accent2">
+                    <a:lumMod val="75000"/>
+                  </a:schemeClr>
+                </a:solidFill>
+                <a:effectLst/>
+                <a:latin typeface="Consolas" panose="020B0609020204030204" pitchFamily="49" charset="0"/>
+              </a:rPr>
+              <a:t>"temperature"</a:t>
+            </a:r>
+            <a:r>
+              <a:rPr lang="en-US" sz="1300" b="0" dirty="0">
+                <a:solidFill>
                   <a:schemeClr val="accent1"/>
                 </a:solidFill>
                 <a:effectLst/>
@@ -19425,12 +19684,34 @@
             <a:r>
               <a:rPr lang="en-US" sz="1300" b="0" dirty="0">
                 <a:solidFill>
+                  <a:schemeClr val="accent2">
+                    <a:lumMod val="75000"/>
+                  </a:schemeClr>
+                </a:solidFill>
+                <a:effectLst/>
+                <a:latin typeface="Consolas" panose="020B0609020204030204" pitchFamily="49" charset="0"/>
+              </a:rPr>
+              <a:t>"unit"</a:t>
+            </a:r>
+            <a:r>
+              <a:rPr lang="en-US" sz="1300" b="0" dirty="0">
+                <a:solidFill>
+                  <a:schemeClr val="accent1"/>
+                </a:solidFill>
+                <a:effectLst/>
+                <a:latin typeface="Consolas" panose="020B0609020204030204" pitchFamily="49" charset="0"/>
+              </a:rPr>
+              <a:t>: </a:t>
+            </a:r>
+            <a:r>
+              <a:rPr lang="en-US" sz="1300" b="0" dirty="0">
+                <a:solidFill>
                   <a:schemeClr val="accent2"/>
                 </a:solidFill>
                 <a:effectLst/>
                 <a:latin typeface="Consolas" panose="020B0609020204030204" pitchFamily="49" charset="0"/>
               </a:rPr>
-              <a:t>"unit"</a:t>
+              <a:t>"Celsius"</a:t>
             </a:r>
             <a:r>
               <a:rPr lang="en-US" sz="1300" b="0" dirty="0">
@@ -19440,74 +19721,62 @@
                 <a:effectLst/>
                 <a:latin typeface="Consolas" panose="020B0609020204030204" pitchFamily="49" charset="0"/>
               </a:rPr>
-              <a:t>: </a:t>
-            </a:r>
+              <a:t>, </a:t>
+            </a:r>
+          </a:p>
+          <a:p>
             <a:r>
               <a:rPr lang="en-US" sz="1300" b="0" dirty="0">
                 <a:solidFill>
-                  <a:schemeClr val="accent2"/>
-                </a:solidFill>
-                <a:effectLst/>
-                <a:latin typeface="Consolas" panose="020B0609020204030204" pitchFamily="49" charset="0"/>
-              </a:rPr>
-              <a:t>"Celsius"</a:t>
+                  <a:schemeClr val="accent1"/>
+                </a:solidFill>
+                <a:effectLst/>
+                <a:latin typeface="Consolas" panose="020B0609020204030204" pitchFamily="49" charset="0"/>
+              </a:rPr>
+              <a:t>    </a:t>
             </a:r>
             <a:r>
               <a:rPr lang="en-US" sz="1300" b="0" dirty="0">
                 <a:solidFill>
-                  <a:schemeClr val="accent1"/>
-                </a:solidFill>
-                <a:effectLst/>
-                <a:latin typeface="Consolas" panose="020B0609020204030204" pitchFamily="49" charset="0"/>
-              </a:rPr>
-              <a:t>, </a:t>
-            </a:r>
-          </a:p>
-          <a:p>
+                  <a:schemeClr val="accent2">
+                    <a:lumMod val="75000"/>
+                  </a:schemeClr>
+                </a:solidFill>
+                <a:effectLst/>
+                <a:latin typeface="Consolas" panose="020B0609020204030204" pitchFamily="49" charset="0"/>
+              </a:rPr>
+              <a:t>"temp</a:t>
+            </a:r>
+            <a:r>
+              <a:rPr lang="tr-TR" sz="1300" b="0" dirty="0">
+                <a:solidFill>
+                  <a:schemeClr val="accent2">
+                    <a:lumMod val="75000"/>
+                  </a:schemeClr>
+                </a:solidFill>
+                <a:effectLst/>
+                <a:latin typeface="Consolas" panose="020B0609020204030204" pitchFamily="49" charset="0"/>
+              </a:rPr>
+              <a:t>e</a:t>
+            </a:r>
+            <a:r>
+              <a:rPr lang="en-US" sz="1300" b="0" dirty="0" err="1">
+                <a:solidFill>
+                  <a:schemeClr val="accent2">
+                    <a:lumMod val="75000"/>
+                  </a:schemeClr>
+                </a:solidFill>
+                <a:effectLst/>
+                <a:latin typeface="Consolas" panose="020B0609020204030204" pitchFamily="49" charset="0"/>
+              </a:rPr>
+              <a:t>ratureOf</a:t>
+            </a:r>
             <a:r>
               <a:rPr lang="en-US" sz="1300" b="0" dirty="0">
                 <a:solidFill>
-                  <a:schemeClr val="accent1"/>
-                </a:solidFill>
-                <a:effectLst/>
-                <a:latin typeface="Consolas" panose="020B0609020204030204" pitchFamily="49" charset="0"/>
-              </a:rPr>
-              <a:t>    </a:t>
-            </a:r>
-            <a:r>
-              <a:rPr lang="en-US" sz="1300" b="0" dirty="0">
-                <a:solidFill>
-                  <a:schemeClr val="accent2"/>
-                </a:solidFill>
-                <a:effectLst/>
-                <a:latin typeface="Consolas" panose="020B0609020204030204" pitchFamily="49" charset="0"/>
-              </a:rPr>
-              <a:t>"temp</a:t>
-            </a:r>
-            <a:r>
-              <a:rPr lang="tr-TR" sz="1300" b="0" dirty="0">
-                <a:solidFill>
-                  <a:schemeClr val="accent2"/>
-                </a:solidFill>
-                <a:effectLst/>
-                <a:latin typeface="Consolas" panose="020B0609020204030204" pitchFamily="49" charset="0"/>
-              </a:rPr>
-              <a:t>e</a:t>
-            </a:r>
-            <a:r>
-              <a:rPr lang="en-US" sz="1300" b="0" dirty="0" err="1">
-                <a:solidFill>
-                  <a:schemeClr val="accent2"/>
-                </a:solidFill>
-                <a:effectLst/>
-                <a:latin typeface="Consolas" panose="020B0609020204030204" pitchFamily="49" charset="0"/>
-              </a:rPr>
-              <a:t>ratureOf</a:t>
-            </a:r>
-            <a:r>
-              <a:rPr lang="en-US" sz="1300" b="0" dirty="0">
-                <a:solidFill>
-                  <a:schemeClr val="accent2"/>
+                  <a:schemeClr val="accent2">
+                    <a:lumMod val="75000"/>
+                  </a:schemeClr>
                 </a:solidFill>
                 <a:effectLst/>
                 <a:latin typeface="Consolas" panose="020B0609020204030204" pitchFamily="49" charset="0"/>
@@ -20922,7 +21191,9 @@
               <a:r>
                 <a:rPr lang="en-US" sz="2000" b="0" dirty="0">
                   <a:solidFill>
-                    <a:schemeClr val="accent2"/>
+                    <a:schemeClr val="accent2">
+                      <a:lumMod val="75000"/>
+                    </a:schemeClr>
                   </a:solidFill>
                   <a:effectLst/>
                   <a:latin typeface="Consolas" panose="020B0609020204030204" pitchFamily="49" charset="0"/>
@@ -21014,7 +21285,9 @@
               <a:r>
                 <a:rPr lang="en-US" sz="2000" b="0" dirty="0">
                   <a:solidFill>
-                    <a:schemeClr val="accent2"/>
+                    <a:schemeClr val="accent2">
+                      <a:lumMod val="75000"/>
+                    </a:schemeClr>
                   </a:solidFill>
                   <a:effectLst/>
                   <a:latin typeface="Consolas" panose="020B0609020204030204" pitchFamily="49" charset="0"/>
@@ -21086,7 +21359,9 @@
               <a:r>
                 <a:rPr lang="en-US" sz="2000" b="0" dirty="0">
                   <a:solidFill>
-                    <a:schemeClr val="accent2"/>
+                    <a:schemeClr val="accent2">
+                      <a:lumMod val="75000"/>
+                    </a:schemeClr>
                   </a:solidFill>
                   <a:effectLst/>
                   <a:latin typeface="Consolas" panose="020B0609020204030204" pitchFamily="49" charset="0"/>
@@ -21096,7 +21371,9 @@
               <a:r>
                 <a:rPr lang="tr-TR" sz="2000" b="0" dirty="0">
                   <a:solidFill>
-                    <a:schemeClr val="accent2"/>
+                    <a:schemeClr val="accent2">
+                      <a:lumMod val="75000"/>
+                    </a:schemeClr>
                   </a:solidFill>
                   <a:effectLst/>
                   <a:latin typeface="Consolas" panose="020B0609020204030204" pitchFamily="49" charset="0"/>
@@ -21106,7 +21383,9 @@
               <a:r>
                 <a:rPr lang="en-US" sz="2000" b="0" dirty="0" err="1">
                   <a:solidFill>
-                    <a:schemeClr val="accent2"/>
+                    <a:schemeClr val="accent2">
+                      <a:lumMod val="75000"/>
+                    </a:schemeClr>
                   </a:solidFill>
                   <a:effectLst/>
                   <a:latin typeface="Consolas" panose="020B0609020204030204" pitchFamily="49" charset="0"/>
@@ -21116,7 +21395,9 @@
               <a:r>
                 <a:rPr lang="en-US" sz="2000" b="0" dirty="0">
                   <a:solidFill>
-                    <a:schemeClr val="accent2"/>
+                    <a:schemeClr val="accent2">
+                      <a:lumMod val="75000"/>
+                    </a:schemeClr>
                   </a:solidFill>
                   <a:effectLst/>
                   <a:latin typeface="Consolas" panose="020B0609020204030204" pitchFamily="49" charset="0"/>
@@ -21205,7 +21486,17 @@
                   <a:effectLst/>
                   <a:latin typeface="Consolas" panose="020B0609020204030204" pitchFamily="49" charset="0"/>
                 </a:rPr>
-                <a:t> "required"</a:t>
+                <a:t> </a:t>
+              </a:r>
+              <a:r>
+                <a:rPr lang="en-US" sz="2000" b="0" dirty="0">
+                  <a:solidFill>
+                    <a:schemeClr val="accent5"/>
+                  </a:solidFill>
+                  <a:effectLst/>
+                  <a:latin typeface="Consolas" panose="020B0609020204030204" pitchFamily="49" charset="0"/>
+                </a:rPr>
+                <a:t>"required"</a:t>
               </a:r>
               <a:r>
                 <a:rPr lang="en-US" sz="2000" b="0" dirty="0">
@@ -21272,7 +21563,7 @@
               <a:r>
                 <a:rPr lang="en-US" sz="2000" b="0" dirty="0">
                   <a:solidFill>
-                    <a:schemeClr val="accent2"/>
+                    <a:schemeClr val="accent5"/>
                   </a:solidFill>
                   <a:effectLst/>
                   <a:latin typeface="Consolas" panose="020B0609020204030204" pitchFamily="49" charset="0"/>
@@ -21282,7 +21573,7 @@
               <a:r>
                 <a:rPr lang="en-US" sz="2000" b="0" dirty="0" err="1">
                   <a:solidFill>
-                    <a:schemeClr val="accent2"/>
+                    <a:schemeClr val="accent5"/>
                   </a:solidFill>
                   <a:effectLst/>
                   <a:latin typeface="Consolas" panose="020B0609020204030204" pitchFamily="49" charset="0"/>
@@ -21292,7 +21583,7 @@
               <a:r>
                 <a:rPr lang="en-US" sz="2000" b="0" dirty="0">
                   <a:solidFill>
-                    <a:schemeClr val="accent2"/>
+                    <a:schemeClr val="accent5"/>
                   </a:solidFill>
                   <a:effectLst/>
                   <a:latin typeface="Consolas" panose="020B0609020204030204" pitchFamily="49" charset="0"/>
@@ -21583,7 +21874,19 @@
                   <a:effectLst/>
                   <a:latin typeface="Consolas" panose="020B0609020204030204" pitchFamily="49" charset="0"/>
                 </a:rPr>
-                <a:t> "temperature"</a:t>
+                <a:t> </a:t>
+              </a:r>
+              <a:r>
+                <a:rPr lang="en-US" sz="2400" b="0" dirty="0">
+                  <a:solidFill>
+                    <a:schemeClr val="accent2">
+                      <a:lumMod val="75000"/>
+                    </a:schemeClr>
+                  </a:solidFill>
+                  <a:effectLst/>
+                  <a:latin typeface="Consolas" panose="020B0609020204030204" pitchFamily="49" charset="0"/>
+                </a:rPr>
+                <a:t>"temperature"</a:t>
               </a:r>
               <a:r>
                 <a:rPr lang="en-US" sz="2400" b="0" dirty="0">
@@ -21630,7 +21933,9 @@
               <a:r>
                 <a:rPr lang="en-US" sz="2400" b="0" dirty="0">
                   <a:solidFill>
-                    <a:schemeClr val="accent2"/>
+                    <a:schemeClr val="accent2">
+                      <a:lumMod val="75000"/>
+                    </a:schemeClr>
                   </a:solidFill>
                   <a:effectLst/>
                   <a:latin typeface="Consolas" panose="020B0609020204030204" pitchFamily="49" charset="0"/>
@@ -21682,7 +21987,9 @@
               <a:r>
                 <a:rPr lang="en-US" sz="2400" b="0" dirty="0">
                   <a:solidFill>
-                    <a:schemeClr val="accent2"/>
+                    <a:schemeClr val="accent2">
+                      <a:lumMod val="75000"/>
+                    </a:schemeClr>
                   </a:solidFill>
                   <a:effectLst/>
                   <a:latin typeface="Consolas" panose="020B0609020204030204" pitchFamily="49" charset="0"/>
@@ -21692,7 +21999,9 @@
               <a:r>
                 <a:rPr lang="tr-TR" sz="2400" b="0" dirty="0">
                   <a:solidFill>
-                    <a:schemeClr val="accent2"/>
+                    <a:schemeClr val="accent2">
+                      <a:lumMod val="75000"/>
+                    </a:schemeClr>
                   </a:solidFill>
                   <a:effectLst/>
                   <a:latin typeface="Consolas" panose="020B0609020204030204" pitchFamily="49" charset="0"/>
@@ -21702,7 +22011,9 @@
               <a:r>
                 <a:rPr lang="en-US" sz="2400" b="0" dirty="0" err="1">
                   <a:solidFill>
-                    <a:schemeClr val="accent2"/>
+                    <a:schemeClr val="accent2">
+                      <a:lumMod val="75000"/>
+                    </a:schemeClr>
                   </a:solidFill>
                   <a:effectLst/>
                   <a:latin typeface="Consolas" panose="020B0609020204030204" pitchFamily="49" charset="0"/>
@@ -21712,7 +22023,9 @@
               <a:r>
                 <a:rPr lang="en-US" sz="2400" b="0" dirty="0">
                   <a:solidFill>
-                    <a:schemeClr val="accent2"/>
+                    <a:schemeClr val="accent2">
+                      <a:lumMod val="75000"/>
+                    </a:schemeClr>
                   </a:solidFill>
                   <a:effectLst/>
                   <a:latin typeface="Consolas" panose="020B0609020204030204" pitchFamily="49" charset="0"/>
@@ -22445,7 +22758,9 @@
               <a:r>
                 <a:rPr lang="en-US" sz="1300" b="0" dirty="0">
                   <a:solidFill>
-                    <a:schemeClr val="accent2"/>
+                    <a:schemeClr val="accent2">
+                      <a:lumMod val="75000"/>
+                    </a:schemeClr>
                   </a:solidFill>
                   <a:effectLst/>
                   <a:latin typeface="Consolas" panose="020B0609020204030204" pitchFamily="49" charset="0"/>
@@ -22537,7 +22852,9 @@
               <a:r>
                 <a:rPr lang="en-US" sz="1300" b="0" dirty="0">
                   <a:solidFill>
-                    <a:schemeClr val="accent2"/>
+                    <a:schemeClr val="accent2">
+                      <a:lumMod val="75000"/>
+                    </a:schemeClr>
                   </a:solidFill>
                   <a:effectLst/>
                   <a:latin typeface="Consolas" panose="020B0609020204030204" pitchFamily="49" charset="0"/>
@@ -22609,7 +22926,9 @@
               <a:r>
                 <a:rPr lang="en-US" sz="1300" b="0" dirty="0">
                   <a:solidFill>
-                    <a:schemeClr val="accent2"/>
+                    <a:schemeClr val="accent2">
+                      <a:lumMod val="75000"/>
+                    </a:schemeClr>
                   </a:solidFill>
                   <a:effectLst/>
                   <a:latin typeface="Consolas" panose="020B0609020204030204" pitchFamily="49" charset="0"/>
@@ -22619,7 +22938,9 @@
               <a:r>
                 <a:rPr lang="tr-TR" sz="1300" b="0" dirty="0">
                   <a:solidFill>
-                    <a:schemeClr val="accent2"/>
+                    <a:schemeClr val="accent2">
+                      <a:lumMod val="75000"/>
+                    </a:schemeClr>
                   </a:solidFill>
                   <a:effectLst/>
                   <a:latin typeface="Consolas" panose="020B0609020204030204" pitchFamily="49" charset="0"/>
@@ -22629,7 +22950,9 @@
               <a:r>
                 <a:rPr lang="en-US" sz="1300" b="0" dirty="0" err="1">
                   <a:solidFill>
-                    <a:schemeClr val="accent2"/>
+                    <a:schemeClr val="accent2">
+                      <a:lumMod val="75000"/>
+                    </a:schemeClr>
                   </a:solidFill>
                   <a:effectLst/>
                   <a:latin typeface="Consolas" panose="020B0609020204030204" pitchFamily="49" charset="0"/>
@@ -22639,7 +22962,9 @@
               <a:r>
                 <a:rPr lang="en-US" sz="1300" b="0" dirty="0">
                   <a:solidFill>
-                    <a:schemeClr val="accent2"/>
+                    <a:schemeClr val="accent2">
+                      <a:lumMod val="75000"/>
+                    </a:schemeClr>
                   </a:solidFill>
                   <a:effectLst/>
                   <a:latin typeface="Consolas" panose="020B0609020204030204" pitchFamily="49" charset="0"/>
@@ -22728,7 +23053,17 @@
                   <a:effectLst/>
                   <a:latin typeface="Consolas" panose="020B0609020204030204" pitchFamily="49" charset="0"/>
                 </a:rPr>
-                <a:t> "required"</a:t>
+                <a:t> </a:t>
+              </a:r>
+              <a:r>
+                <a:rPr lang="en-US" sz="1300" b="0" dirty="0">
+                  <a:solidFill>
+                    <a:schemeClr val="accent5"/>
+                  </a:solidFill>
+                  <a:effectLst/>
+                  <a:latin typeface="Consolas" panose="020B0609020204030204" pitchFamily="49" charset="0"/>
+                </a:rPr>
+                <a:t>"required"</a:t>
               </a:r>
               <a:r>
                 <a:rPr lang="en-US" sz="1300" b="0" dirty="0">
@@ -22795,7 +23130,7 @@
               <a:r>
                 <a:rPr lang="en-US" sz="1300" b="0" dirty="0">
                   <a:solidFill>
-                    <a:schemeClr val="accent2"/>
+                    <a:schemeClr val="accent5"/>
                   </a:solidFill>
                   <a:effectLst/>
                   <a:latin typeface="Consolas" panose="020B0609020204030204" pitchFamily="49" charset="0"/>
@@ -22805,7 +23140,7 @@
               <a:r>
                 <a:rPr lang="en-US" sz="1300" b="0" dirty="0" err="1">
                   <a:solidFill>
-                    <a:schemeClr val="accent2"/>
+                    <a:schemeClr val="accent5"/>
                   </a:solidFill>
                   <a:effectLst/>
                   <a:latin typeface="Consolas" panose="020B0609020204030204" pitchFamily="49" charset="0"/>
@@ -22815,7 +23150,7 @@
               <a:r>
                 <a:rPr lang="en-US" sz="1300" b="0" dirty="0">
                   <a:solidFill>
-                    <a:schemeClr val="accent2"/>
+                    <a:schemeClr val="accent5"/>
                   </a:solidFill>
                   <a:effectLst/>
                   <a:latin typeface="Consolas" panose="020B0609020204030204" pitchFamily="49" charset="0"/>
@@ -22925,7 +23260,19 @@
                   <a:effectLst/>
                   <a:latin typeface="Consolas" panose="020B0609020204030204" pitchFamily="49" charset="0"/>
                 </a:rPr>
-                <a:t> "temperature"</a:t>
+                <a:t> </a:t>
+              </a:r>
+              <a:r>
+                <a:rPr lang="en-US" sz="1300" b="0" dirty="0">
+                  <a:solidFill>
+                    <a:schemeClr val="accent2">
+                      <a:lumMod val="75000"/>
+                    </a:schemeClr>
+                  </a:solidFill>
+                  <a:effectLst/>
+                  <a:latin typeface="Consolas" panose="020B0609020204030204" pitchFamily="49" charset="0"/>
+                </a:rPr>
+                <a:t>"temperature"</a:t>
               </a:r>
               <a:r>
                 <a:rPr lang="en-US" sz="1300" b="0" dirty="0">
@@ -22972,7 +23319,9 @@
               <a:r>
                 <a:rPr lang="en-US" sz="1300" b="0" dirty="0">
                   <a:solidFill>
-                    <a:schemeClr val="accent2"/>
+                    <a:schemeClr val="accent2">
+                      <a:lumMod val="75000"/>
+                    </a:schemeClr>
                   </a:solidFill>
                   <a:effectLst/>
                   <a:latin typeface="Consolas" panose="020B0609020204030204" pitchFamily="49" charset="0"/>
@@ -23019,22 +23368,26 @@
                   <a:effectLst/>
                   <a:latin typeface="Consolas" panose="020B0609020204030204" pitchFamily="49" charset="0"/>
                 </a:rPr>
-                <a:t>    </a:t>
+                <a:t>   </a:t>
               </a:r>
               <a:r>
                 <a:rPr lang="en-US" sz="1300" b="0" dirty="0">
                   <a:solidFill>
-                    <a:schemeClr val="accent2"/>
+                    <a:schemeClr val="accent2">
+                      <a:lumMod val="75000"/>
+                    </a:schemeClr>
                   </a:solidFill>
                   <a:effectLst/>
                   <a:latin typeface="Consolas" panose="020B0609020204030204" pitchFamily="49" charset="0"/>
                 </a:rPr>
-                <a:t>"temp</a:t>
+                <a:t> "temp</a:t>
               </a:r>
               <a:r>
                 <a:rPr lang="tr-TR" sz="1300" b="0" dirty="0">
                   <a:solidFill>
-                    <a:schemeClr val="accent2"/>
+                    <a:schemeClr val="accent2">
+                      <a:lumMod val="75000"/>
+                    </a:schemeClr>
                   </a:solidFill>
                   <a:effectLst/>
                   <a:latin typeface="Consolas" panose="020B0609020204030204" pitchFamily="49" charset="0"/>
@@ -23044,7 +23397,9 @@
               <a:r>
                 <a:rPr lang="en-US" sz="1300" b="0" dirty="0" err="1">
                   <a:solidFill>
-                    <a:schemeClr val="accent2"/>
+                    <a:schemeClr val="accent2">
+                      <a:lumMod val="75000"/>
+                    </a:schemeClr>
                   </a:solidFill>
                   <a:effectLst/>
                   <a:latin typeface="Consolas" panose="020B0609020204030204" pitchFamily="49" charset="0"/>
@@ -23054,7 +23409,9 @@
               <a:r>
                 <a:rPr lang="en-US" sz="1300" b="0" dirty="0">
                   <a:solidFill>
-                    <a:schemeClr val="accent2"/>
+                    <a:schemeClr val="accent2">
+                      <a:lumMod val="75000"/>
+                    </a:schemeClr>
                   </a:solidFill>
                   <a:effectLst/>
                   <a:latin typeface="Consolas" panose="020B0609020204030204" pitchFamily="49" charset="0"/>
@@ -24588,11 +24945,11 @@
   <p:clrMapOvr>
     <a:masterClrMapping/>
   </p:clrMapOvr>
-  <mc:AlternateContent xmlns:mc="http://schemas.openxmlformats.org/markup-compatibility/2006">
-    <mc:Choice xmlns:p14="http://schemas.microsoft.com/office/powerpoint/2010/main" Requires="p14">
+  <mc:AlternateContent xmlns:mc="http://schemas.openxmlformats.org/markup-compatibility/2006" xmlns:p14="http://schemas.microsoft.com/office/powerpoint/2010/main">
+    <mc:Choice Requires="p14">
       <p:transition spd="slow" p14:dur="2000" advClick="0" advTm="500"/>
     </mc:Choice>
-    <mc:Fallback>
+    <mc:Fallback xmlns="">
       <p:transition spd="slow" advClick="0" advTm="500"/>
     </mc:Fallback>
   </mc:AlternateContent>
@@ -25463,13 +25820,13 @@
   <p:clrMapOvr>
     <a:masterClrMapping/>
   </p:clrMapOvr>
-  <mc:AlternateContent xmlns:mc="http://schemas.openxmlformats.org/markup-compatibility/2006">
-    <mc:Choice xmlns:p159="http://schemas.microsoft.com/office/powerpoint/2015/09/main" Requires="p159">
+  <mc:AlternateContent xmlns:mc="http://schemas.openxmlformats.org/markup-compatibility/2006" xmlns:p159="http://schemas.microsoft.com/office/powerpoint/2015/09/main">
+    <mc:Choice Requires="p159">
       <p:transition xmlns:p14="http://schemas.microsoft.com/office/powerpoint/2010/main" spd="slow" p14:dur="2000" advClick="0" advTm="4000">
         <p159:morph option="byObject"/>
       </p:transition>
     </mc:Choice>
-    <mc:Fallback>
+    <mc:Fallback xmlns="">
       <p:transition spd="slow" advClick="0" advTm="4000">
         <p:fade/>
       </p:transition>
@@ -25541,13 +25898,13 @@
   <p:clrMapOvr>
     <a:masterClrMapping/>
   </p:clrMapOvr>
-  <mc:AlternateContent xmlns:mc="http://schemas.openxmlformats.org/markup-compatibility/2006">
-    <mc:Choice xmlns:p159="http://schemas.microsoft.com/office/powerpoint/2015/09/main" Requires="p159">
+  <mc:AlternateContent xmlns:mc="http://schemas.openxmlformats.org/markup-compatibility/2006" xmlns:p159="http://schemas.microsoft.com/office/powerpoint/2015/09/main">
+    <mc:Choice Requires="p159">
       <p:transition xmlns:p14="http://schemas.microsoft.com/office/powerpoint/2010/main" spd="slow" p14:dur="2000">
         <p159:morph option="byObject"/>
       </p:transition>
     </mc:Choice>
-    <mc:Fallback>
+    <mc:Fallback xmlns="">
       <p:transition spd="slow">
         <p:fade/>
       </p:transition>

</xml_diff>